<commit_message>
Wiki  - #014 - Add layering diagrams to wiki
Update powerpoint diagrams and images
</commit_message>
<xml_diff>
--- a/Wiki/Layering/Layering.pptx
+++ b/Wiki/Layering/Layering.pptx
@@ -8,6 +8,7 @@
     <p:sldId id="256" r:id="rId2"/>
     <p:sldId id="257" r:id="rId3"/>
     <p:sldId id="258" r:id="rId4"/>
+    <p:sldId id="259" r:id="rId5"/>
   </p:sldIdLst>
   <p:sldSz cx="12192000" cy="6858000"/>
   <p:notesSz cx="6858000" cy="9144000"/>
@@ -106,6 +107,11 @@
       </a:defRPr>
     </a:lvl9pPr>
   </p:defaultTextStyle>
+  <p:extLst>
+    <p:ext uri="{EFAFB233-063F-42B5-8137-9DF3F51BA10A}">
+      <p15:sldGuideLst xmlns:p15="http://schemas.microsoft.com/office/powerpoint/2012/main"/>
+    </p:ext>
+  </p:extLst>
 </p:presentation>
 </file>
 
@@ -154,7 +160,6 @@
               <a:rPr lang="en-US"/>
               <a:t>Click to edit Master title style</a:t>
             </a:r>
-            <a:endParaRPr lang="en-US"/>
           </a:p>
         </p:txBody>
       </p:sp>
@@ -219,7 +224,6 @@
               <a:rPr lang="en-US"/>
               <a:t>Click to edit Master subtitle style</a:t>
             </a:r>
-            <a:endParaRPr lang="en-US"/>
           </a:p>
         </p:txBody>
       </p:sp>
@@ -240,7 +244,7 @@
           <a:p>
             <a:fld id="{BAA45923-BDAF-4550-A619-2DB861A04C19}" type="datetimeFigureOut">
               <a:rPr lang="en-US" smtClean="0"/>
-              <a:t>07-Mar-17</a:t>
+              <a:t>12-Mar-17</a:t>
             </a:fld>
             <a:endParaRPr lang="en-US"/>
           </a:p>
@@ -337,7 +341,6 @@
               <a:rPr lang="en-US"/>
               <a:t>Click to edit Master title style</a:t>
             </a:r>
-            <a:endParaRPr lang="en-US"/>
           </a:p>
         </p:txBody>
       </p:sp>
@@ -389,7 +392,6 @@
               <a:rPr lang="en-US"/>
               <a:t>Fifth level</a:t>
             </a:r>
-            <a:endParaRPr lang="en-US"/>
           </a:p>
         </p:txBody>
       </p:sp>
@@ -410,7 +412,7 @@
           <a:p>
             <a:fld id="{BAA45923-BDAF-4550-A619-2DB861A04C19}" type="datetimeFigureOut">
               <a:rPr lang="en-US" smtClean="0"/>
-              <a:t>07-Mar-17</a:t>
+              <a:t>12-Mar-17</a:t>
             </a:fld>
             <a:endParaRPr lang="en-US"/>
           </a:p>
@@ -512,7 +514,6 @@
               <a:rPr lang="en-US"/>
               <a:t>Click to edit Master title style</a:t>
             </a:r>
-            <a:endParaRPr lang="en-US"/>
           </a:p>
         </p:txBody>
       </p:sp>
@@ -569,7 +570,6 @@
               <a:rPr lang="en-US"/>
               <a:t>Fifth level</a:t>
             </a:r>
-            <a:endParaRPr lang="en-US"/>
           </a:p>
         </p:txBody>
       </p:sp>
@@ -590,7 +590,7 @@
           <a:p>
             <a:fld id="{BAA45923-BDAF-4550-A619-2DB861A04C19}" type="datetimeFigureOut">
               <a:rPr lang="en-US" smtClean="0"/>
-              <a:t>07-Mar-17</a:t>
+              <a:t>12-Mar-17</a:t>
             </a:fld>
             <a:endParaRPr lang="en-US"/>
           </a:p>
@@ -687,7 +687,6 @@
               <a:rPr lang="en-US"/>
               <a:t>Click to edit Master title style</a:t>
             </a:r>
-            <a:endParaRPr lang="en-US"/>
           </a:p>
         </p:txBody>
       </p:sp>
@@ -739,7 +738,6 @@
               <a:rPr lang="en-US"/>
               <a:t>Fifth level</a:t>
             </a:r>
-            <a:endParaRPr lang="en-US"/>
           </a:p>
         </p:txBody>
       </p:sp>
@@ -760,7 +758,7 @@
           <a:p>
             <a:fld id="{BAA45923-BDAF-4550-A619-2DB861A04C19}" type="datetimeFigureOut">
               <a:rPr lang="en-US" smtClean="0"/>
-              <a:t>07-Mar-17</a:t>
+              <a:t>12-Mar-17</a:t>
             </a:fld>
             <a:endParaRPr lang="en-US"/>
           </a:p>
@@ -866,7 +864,6 @@
               <a:rPr lang="en-US"/>
               <a:t>Click to edit Master title style</a:t>
             </a:r>
-            <a:endParaRPr lang="en-US"/>
           </a:p>
         </p:txBody>
       </p:sp>
@@ -1006,7 +1003,7 @@
           <a:p>
             <a:fld id="{BAA45923-BDAF-4550-A619-2DB861A04C19}" type="datetimeFigureOut">
               <a:rPr lang="en-US" smtClean="0"/>
-              <a:t>07-Mar-17</a:t>
+              <a:t>12-Mar-17</a:t>
             </a:fld>
             <a:endParaRPr lang="en-US"/>
           </a:p>
@@ -1103,7 +1100,6 @@
               <a:rPr lang="en-US"/>
               <a:t>Click to edit Master title style</a:t>
             </a:r>
-            <a:endParaRPr lang="en-US"/>
           </a:p>
         </p:txBody>
       </p:sp>
@@ -1160,7 +1156,6 @@
               <a:rPr lang="en-US"/>
               <a:t>Fifth level</a:t>
             </a:r>
-            <a:endParaRPr lang="en-US"/>
           </a:p>
         </p:txBody>
       </p:sp>
@@ -1217,7 +1212,6 @@
               <a:rPr lang="en-US"/>
               <a:t>Fifth level</a:t>
             </a:r>
-            <a:endParaRPr lang="en-US"/>
           </a:p>
         </p:txBody>
       </p:sp>
@@ -1238,7 +1232,7 @@
           <a:p>
             <a:fld id="{BAA45923-BDAF-4550-A619-2DB861A04C19}" type="datetimeFigureOut">
               <a:rPr lang="en-US" smtClean="0"/>
-              <a:t>07-Mar-17</a:t>
+              <a:t>12-Mar-17</a:t>
             </a:fld>
             <a:endParaRPr lang="en-US"/>
           </a:p>
@@ -1340,7 +1334,6 @@
               <a:rPr lang="en-US"/>
               <a:t>Click to edit Master title style</a:t>
             </a:r>
-            <a:endParaRPr lang="en-US"/>
           </a:p>
         </p:txBody>
       </p:sp>
@@ -1462,7 +1455,6 @@
               <a:rPr lang="en-US"/>
               <a:t>Fifth level</a:t>
             </a:r>
-            <a:endParaRPr lang="en-US"/>
           </a:p>
         </p:txBody>
       </p:sp>
@@ -1584,7 +1576,6 @@
               <a:rPr lang="en-US"/>
               <a:t>Fifth level</a:t>
             </a:r>
-            <a:endParaRPr lang="en-US"/>
           </a:p>
         </p:txBody>
       </p:sp>
@@ -1605,7 +1596,7 @@
           <a:p>
             <a:fld id="{BAA45923-BDAF-4550-A619-2DB861A04C19}" type="datetimeFigureOut">
               <a:rPr lang="en-US" smtClean="0"/>
-              <a:t>07-Mar-17</a:t>
+              <a:t>12-Mar-17</a:t>
             </a:fld>
             <a:endParaRPr lang="en-US"/>
           </a:p>
@@ -1702,7 +1693,6 @@
               <a:rPr lang="en-US"/>
               <a:t>Click to edit Master title style</a:t>
             </a:r>
-            <a:endParaRPr lang="en-US"/>
           </a:p>
         </p:txBody>
       </p:sp>
@@ -1723,7 +1713,7 @@
           <a:p>
             <a:fld id="{BAA45923-BDAF-4550-A619-2DB861A04C19}" type="datetimeFigureOut">
               <a:rPr lang="en-US" smtClean="0"/>
-              <a:t>07-Mar-17</a:t>
+              <a:t>12-Mar-17</a:t>
             </a:fld>
             <a:endParaRPr lang="en-US"/>
           </a:p>
@@ -1818,7 +1808,7 @@
           <a:p>
             <a:fld id="{BAA45923-BDAF-4550-A619-2DB861A04C19}" type="datetimeFigureOut">
               <a:rPr lang="en-US" smtClean="0"/>
-              <a:t>07-Mar-17</a:t>
+              <a:t>12-Mar-17</a:t>
             </a:fld>
             <a:endParaRPr lang="en-US"/>
           </a:p>
@@ -1924,7 +1914,6 @@
               <a:rPr lang="en-US"/>
               <a:t>Click to edit Master title style</a:t>
             </a:r>
-            <a:endParaRPr lang="en-US"/>
           </a:p>
         </p:txBody>
       </p:sp>
@@ -2009,7 +1998,6 @@
               <a:rPr lang="en-US"/>
               <a:t>Fifth level</a:t>
             </a:r>
-            <a:endParaRPr lang="en-US"/>
           </a:p>
         </p:txBody>
       </p:sp>
@@ -2095,7 +2083,7 @@
           <a:p>
             <a:fld id="{BAA45923-BDAF-4550-A619-2DB861A04C19}" type="datetimeFigureOut">
               <a:rPr lang="en-US" smtClean="0"/>
-              <a:t>07-Mar-17</a:t>
+              <a:t>12-Mar-17</a:t>
             </a:fld>
             <a:endParaRPr lang="en-US"/>
           </a:p>
@@ -2201,7 +2189,6 @@
               <a:rPr lang="en-US"/>
               <a:t>Click to edit Master title style</a:t>
             </a:r>
-            <a:endParaRPr lang="en-US"/>
           </a:p>
         </p:txBody>
       </p:sp>
@@ -2348,7 +2335,7 @@
           <a:p>
             <a:fld id="{BAA45923-BDAF-4550-A619-2DB861A04C19}" type="datetimeFigureOut">
               <a:rPr lang="en-US" smtClean="0"/>
-              <a:t>07-Mar-17</a:t>
+              <a:t>12-Mar-17</a:t>
             </a:fld>
             <a:endParaRPr lang="en-US"/>
           </a:p>
@@ -2460,7 +2447,6 @@
               <a:rPr lang="en-US"/>
               <a:t>Click to edit Master title style</a:t>
             </a:r>
-            <a:endParaRPr lang="en-US"/>
           </a:p>
         </p:txBody>
       </p:sp>
@@ -2522,7 +2508,6 @@
               <a:rPr lang="en-US"/>
               <a:t>Fifth level</a:t>
             </a:r>
-            <a:endParaRPr lang="en-US"/>
           </a:p>
         </p:txBody>
       </p:sp>
@@ -2561,7 +2546,7 @@
           <a:p>
             <a:fld id="{BAA45923-BDAF-4550-A619-2DB861A04C19}" type="datetimeFigureOut">
               <a:rPr lang="en-US" smtClean="0"/>
-              <a:t>07-Mar-17</a:t>
+              <a:t>12-Mar-17</a:t>
             </a:fld>
             <a:endParaRPr lang="en-US"/>
           </a:p>
@@ -3087,8 +3072,13 @@
               <a:lumMod val="75000"/>
             </a:schemeClr>
           </a:solidFill>
-          <a:ln w="19050">
-            <a:prstDash val="lgDashDotDot"/>
+          <a:ln w="50800" cap="sq" cmpd="dbl">
+            <a:solidFill>
+              <a:schemeClr val="accent1">
+                <a:shade val="50000"/>
+              </a:schemeClr>
+            </a:solidFill>
+            <a:prstDash val="solid"/>
           </a:ln>
         </p:spPr>
         <p:style>
@@ -3360,8 +3350,13 @@
               <a:lumMod val="75000"/>
             </a:schemeClr>
           </a:solidFill>
-          <a:ln w="19050">
-            <a:prstDash val="lgDashDotDot"/>
+          <a:ln w="50800" cap="sq" cmpd="dbl">
+            <a:solidFill>
+              <a:schemeClr val="accent1">
+                <a:shade val="50000"/>
+              </a:schemeClr>
+            </a:solidFill>
+            <a:prstDash val="solid"/>
           </a:ln>
         </p:spPr>
         <p:style>
@@ -3381,7 +3376,12 @@
           </a:fontRef>
         </p:style>
         <p:txBody>
-          <a:bodyPr rtlCol="0" anchor="ctr"/>
+          <a:bodyPr rot="0" spcFirstLastPara="0" vertOverflow="overflow" horzOverflow="overflow" vert="horz" wrap="square" lIns="91440" tIns="45720" rIns="91440" bIns="45720" numCol="1" spcCol="0" rtlCol="0" fromWordArt="0" anchor="ctr" anchorCtr="0" forceAA="0" compatLnSpc="1">
+            <a:prstTxWarp prst="textNoShape">
+              <a:avLst/>
+            </a:prstTxWarp>
+            <a:noAutofit/>
+          </a:bodyPr>
           <a:lstStyle/>
           <a:p>
             <a:pPr algn="ctr"/>
@@ -3793,7 +3793,7 @@
           <a:lstStyle/>
           <a:p>
             <a:r>
-              <a:rPr lang="fr-CA" sz="1050" dirty="0" err="1">
+              <a:rPr lang="fr-CA" sz="1050" dirty="0">
                 <a:latin typeface="Calisto MT" panose="02040603050505030304" pitchFamily="18" charset="0"/>
               </a:rPr>
               <a:t>Stretto</a:t>
@@ -3827,16 +3827,10 @@
           <a:lstStyle/>
           <a:p>
             <a:r>
-              <a:rPr lang="fr-CA" sz="1050" dirty="0" err="1">
-                <a:latin typeface="Calisto MT" panose="02040603050505030304" pitchFamily="18" charset="0"/>
-              </a:rPr>
-              <a:t>Third</a:t>
-            </a:r>
-            <a:r>
               <a:rPr lang="fr-CA" sz="1050" dirty="0">
                 <a:latin typeface="Calisto MT" panose="02040603050505030304" pitchFamily="18" charset="0"/>
               </a:rPr>
-              <a:t>-Party</a:t>
+              <a:t>Third-Party</a:t>
             </a:r>
             <a:endParaRPr lang="en-US" sz="1050" dirty="0">
               <a:latin typeface="Calisto MT" panose="02040603050505030304" pitchFamily="18" charset="0"/>
@@ -3846,13 +3840,13 @@
       </p:sp>
       <p:sp>
         <p:nvSpPr>
-          <p:cNvPr id="286" name="Rectangle 285"/>
+          <p:cNvPr id="23" name="Rectangle 22"/>
           <p:cNvSpPr/>
           <p:nvPr/>
         </p:nvSpPr>
         <p:spPr>
           <a:xfrm>
-            <a:off x="1783105" y="2127858"/>
+            <a:off x="7056854" y="4033502"/>
             <a:ext cx="680444" cy="277899"/>
           </a:xfrm>
           <a:prstGeom prst="rect">
@@ -3913,13 +3907,13 @@
       </p:sp>
       <p:sp>
         <p:nvSpPr>
-          <p:cNvPr id="287" name="Rectangle 286"/>
+          <p:cNvPr id="24" name="Rectangle 23"/>
           <p:cNvSpPr/>
           <p:nvPr/>
         </p:nvSpPr>
         <p:spPr>
           <a:xfrm>
-            <a:off x="1783105" y="1730996"/>
+            <a:off x="7056854" y="3636640"/>
             <a:ext cx="680444" cy="277899"/>
           </a:xfrm>
           <a:prstGeom prst="rect">
@@ -3930,8 +3924,13 @@
               <a:lumMod val="85000"/>
             </a:schemeClr>
           </a:solidFill>
-          <a:ln w="19050">
-            <a:prstDash val="lgDashDotDot"/>
+          <a:ln w="50800" cap="sq" cmpd="dbl">
+            <a:solidFill>
+              <a:schemeClr val="accent1">
+                <a:shade val="50000"/>
+              </a:schemeClr>
+            </a:solidFill>
+            <a:prstDash val="solid"/>
           </a:ln>
         </p:spPr>
         <p:style>
@@ -3967,16 +3966,74 @@
                 </a:solidFill>
                 <a:latin typeface="Calisto MT" panose="02040603050505030304" pitchFamily="18" charset="0"/>
               </a:rPr>
-              <a:t>.</a:t>
-            </a:r>
-            <a:r>
-              <a:rPr lang="fr-CA" sz="1400" dirty="0" err="1">
+              <a:t>.exe</a:t>
+            </a:r>
+            <a:endParaRPr lang="en-US" sz="1400" dirty="0">
+              <a:solidFill>
+                <a:schemeClr val="tx1"/>
+              </a:solidFill>
+              <a:latin typeface="Calisto MT" panose="02040603050505030304" pitchFamily="18" charset="0"/>
+            </a:endParaRPr>
+          </a:p>
+        </p:txBody>
+      </p:sp>
+      <p:sp>
+        <p:nvSpPr>
+          <p:cNvPr id="25" name="Rectangle 24"/>
+          <p:cNvSpPr/>
+          <p:nvPr/>
+        </p:nvSpPr>
+        <p:spPr>
+          <a:xfrm>
+            <a:off x="7056854" y="4430364"/>
+            <a:ext cx="680444" cy="277899"/>
+          </a:xfrm>
+          <a:prstGeom prst="rect">
+            <a:avLst/>
+          </a:prstGeom>
+          <a:solidFill>
+            <a:schemeClr val="bg1">
+              <a:lumMod val="85000"/>
+            </a:schemeClr>
+          </a:solidFill>
+          <a:ln w="19050">
+            <a:prstDash val="dash"/>
+          </a:ln>
+        </p:spPr>
+        <p:style>
+          <a:lnRef idx="2">
+            <a:schemeClr val="accent1">
+              <a:shade val="50000"/>
+            </a:schemeClr>
+          </a:lnRef>
+          <a:fillRef idx="1">
+            <a:schemeClr val="accent1"/>
+          </a:fillRef>
+          <a:effectRef idx="0">
+            <a:schemeClr val="accent1"/>
+          </a:effectRef>
+          <a:fontRef idx="minor">
+            <a:schemeClr val="lt1"/>
+          </a:fontRef>
+        </p:style>
+        <p:txBody>
+          <a:bodyPr rot="0" spcFirstLastPara="0" vertOverflow="overflow" horzOverflow="overflow" vert="horz" wrap="square" lIns="91440" tIns="45720" rIns="91440" bIns="45720" numCol="1" spcCol="0" rtlCol="0" fromWordArt="0" anchor="ctr" anchorCtr="0" forceAA="0" compatLnSpc="1">
+            <a:prstTxWarp prst="textNoShape">
+              <a:avLst/>
+            </a:prstTxWarp>
+            <a:noAutofit/>
+          </a:bodyPr>
+          <a:lstStyle/>
+          <a:p>
+            <a:pPr algn="ctr"/>
+            <a:r>
+              <a:rPr lang="fr-CA" sz="1400" dirty="0">
                 <a:solidFill>
                   <a:schemeClr val="tx1"/>
                 </a:solidFill>
                 <a:latin typeface="Calisto MT" panose="02040603050505030304" pitchFamily="18" charset="0"/>
               </a:rPr>
-              <a:t>exe</a:t>
+              <a:t>.dll</a:t>
             </a:r>
             <a:endParaRPr lang="en-US" sz="1400" dirty="0">
               <a:solidFill>
@@ -4138,8 +4195,13 @@
               <a:lumMod val="75000"/>
             </a:schemeClr>
           </a:solidFill>
-          <a:ln w="19050">
-            <a:prstDash val="lgDashDotDot"/>
+          <a:ln w="50800" cap="sq" cmpd="dbl">
+            <a:solidFill>
+              <a:schemeClr val="accent1">
+                <a:shade val="50000"/>
+              </a:schemeClr>
+            </a:solidFill>
+            <a:prstDash val="solid"/>
           </a:ln>
         </p:spPr>
         <p:style>
@@ -4411,8 +4473,13 @@
               <a:lumMod val="75000"/>
             </a:schemeClr>
           </a:solidFill>
-          <a:ln w="19050">
-            <a:prstDash val="lgDashDotDot"/>
+          <a:ln w="50800" cap="sq" cmpd="dbl">
+            <a:solidFill>
+              <a:schemeClr val="accent1">
+                <a:shade val="50000"/>
+              </a:schemeClr>
+            </a:solidFill>
+            <a:prstDash val="solid"/>
           </a:ln>
         </p:spPr>
         <p:style>
@@ -4885,7 +4952,7 @@
           <a:p>
             <a:pPr algn="ctr"/>
             <a:r>
-              <a:rPr lang="fr-CA" sz="1400" dirty="0" err="1">
+              <a:rPr lang="fr-CA" sz="1400" dirty="0">
                 <a:latin typeface="Calisto MT" panose="02040603050505030304" pitchFamily="18" charset="0"/>
               </a:rPr>
               <a:t>JUCEUtils</a:t>
@@ -5016,14 +5083,14 @@
       </p:cxnSp>
       <p:sp>
         <p:nvSpPr>
-          <p:cNvPr id="41" name="TextBox 40"/>
+          <p:cNvPr id="49" name="TextBox 48"/>
           <p:cNvSpPr txBox="1"/>
           <p:nvPr/>
         </p:nvSpPr>
         <p:spPr>
           <a:xfrm>
-            <a:off x="3289300" y="5073650"/>
-            <a:ext cx="3568700" cy="584775"/>
+            <a:off x="2729237" y="1071743"/>
+            <a:ext cx="1225899" cy="261610"/>
           </a:xfrm>
           <a:prstGeom prst="rect">
             <a:avLst/>
@@ -5037,61 +5104,26 @@
           <a:lstStyle/>
           <a:p>
             <a:r>
-              <a:rPr lang="fr-CA" sz="1600" dirty="0">
+              <a:rPr lang="fr-CA" sz="1050" dirty="0">
                 <a:latin typeface="Calisto MT" panose="02040603050505030304" pitchFamily="18" charset="0"/>
               </a:rPr>
-              <a:t>Split Utils </a:t>
-            </a:r>
-            <a:r>
-              <a:rPr lang="fr-CA" sz="1600" dirty="0" err="1">
-                <a:latin typeface="Calisto MT" panose="02040603050505030304" pitchFamily="18" charset="0"/>
-              </a:rPr>
-              <a:t>into</a:t>
-            </a:r>
-            <a:r>
-              <a:rPr lang="fr-CA" sz="1600" dirty="0">
-                <a:latin typeface="Calisto MT" panose="02040603050505030304" pitchFamily="18" charset="0"/>
-              </a:rPr>
-              <a:t> Utils and </a:t>
-            </a:r>
-            <a:r>
-              <a:rPr lang="fr-CA" sz="1600" dirty="0" err="1">
-                <a:latin typeface="Calisto MT" panose="02040603050505030304" pitchFamily="18" charset="0"/>
-              </a:rPr>
-              <a:t>JUCEUtils</a:t>
-            </a:r>
-            <a:endParaRPr lang="fr-CA" sz="1600" dirty="0">
+              <a:t>Stretto</a:t>
+            </a:r>
+            <a:endParaRPr lang="en-US" sz="1050" dirty="0">
               <a:latin typeface="Calisto MT" panose="02040603050505030304" pitchFamily="18" charset="0"/>
             </a:endParaRPr>
           </a:p>
-          <a:p>
-            <a:r>
-              <a:rPr lang="fr-CA" sz="1600" dirty="0" err="1">
-                <a:latin typeface="Calisto MT" panose="02040603050505030304" pitchFamily="18" charset="0"/>
-              </a:rPr>
-              <a:t>Add</a:t>
-            </a:r>
-            <a:r>
-              <a:rPr lang="fr-CA" sz="1600" dirty="0">
-                <a:latin typeface="Calisto MT" panose="02040603050505030304" pitchFamily="18" charset="0"/>
-              </a:rPr>
-              <a:t> Midi</a:t>
-            </a:r>
-            <a:endParaRPr lang="en-US" sz="1600" dirty="0">
-              <a:latin typeface="Calisto MT" panose="02040603050505030304" pitchFamily="18" charset="0"/>
-            </a:endParaRPr>
-          </a:p>
-        </p:txBody>
-      </p:sp>
-      <p:sp>
-        <p:nvSpPr>
-          <p:cNvPr id="49" name="TextBox 48"/>
+        </p:txBody>
+      </p:sp>
+      <p:sp>
+        <p:nvSpPr>
+          <p:cNvPr id="50" name="TextBox 49"/>
           <p:cNvSpPr txBox="1"/>
           <p:nvPr/>
         </p:nvSpPr>
         <p:spPr>
           <a:xfrm>
-            <a:off x="2729237" y="1071743"/>
+            <a:off x="2729237" y="4012974"/>
             <a:ext cx="1225899" cy="261610"/>
           </a:xfrm>
           <a:prstGeom prst="rect">
@@ -5106,10 +5138,10 @@
           <a:lstStyle/>
           <a:p>
             <a:r>
-              <a:rPr lang="fr-CA" sz="1050" dirty="0" err="1">
+              <a:rPr lang="fr-CA" sz="1050" dirty="0">
                 <a:latin typeface="Calisto MT" panose="02040603050505030304" pitchFamily="18" charset="0"/>
               </a:rPr>
-              <a:t>Stretto</a:t>
+              <a:t>Third-Party</a:t>
             </a:r>
             <a:endParaRPr lang="en-US" sz="1050" dirty="0">
               <a:latin typeface="Calisto MT" panose="02040603050505030304" pitchFamily="18" charset="0"/>
@@ -5119,53 +5151,13 @@
       </p:sp>
       <p:sp>
         <p:nvSpPr>
-          <p:cNvPr id="50" name="TextBox 49"/>
-          <p:cNvSpPr txBox="1"/>
-          <p:nvPr/>
-        </p:nvSpPr>
-        <p:spPr>
-          <a:xfrm>
-            <a:off x="2729237" y="4012974"/>
-            <a:ext cx="1225899" cy="261610"/>
-          </a:xfrm>
-          <a:prstGeom prst="rect">
-            <a:avLst/>
-          </a:prstGeom>
-          <a:noFill/>
-        </p:spPr>
-        <p:txBody>
-          <a:bodyPr wrap="square" rtlCol="0">
-            <a:spAutoFit/>
-          </a:bodyPr>
-          <a:lstStyle/>
-          <a:p>
-            <a:r>
-              <a:rPr lang="fr-CA" sz="1050" dirty="0" err="1">
-                <a:latin typeface="Calisto MT" panose="02040603050505030304" pitchFamily="18" charset="0"/>
-              </a:rPr>
-              <a:t>Third</a:t>
-            </a:r>
-            <a:r>
-              <a:rPr lang="fr-CA" sz="1050" dirty="0">
-                <a:latin typeface="Calisto MT" panose="02040603050505030304" pitchFamily="18" charset="0"/>
-              </a:rPr>
-              <a:t>-Party</a:t>
-            </a:r>
-            <a:endParaRPr lang="en-US" sz="1050" dirty="0">
-              <a:latin typeface="Calisto MT" panose="02040603050505030304" pitchFamily="18" charset="0"/>
-            </a:endParaRPr>
-          </a:p>
-        </p:txBody>
-      </p:sp>
-      <p:sp>
-        <p:nvSpPr>
-          <p:cNvPr id="51" name="Rectangle 50"/>
+          <p:cNvPr id="28" name="Rectangle 27"/>
           <p:cNvSpPr/>
           <p:nvPr/>
         </p:nvSpPr>
         <p:spPr>
           <a:xfrm>
-            <a:off x="1783105" y="2127858"/>
+            <a:off x="7056854" y="4033502"/>
             <a:ext cx="680444" cy="277899"/>
           </a:xfrm>
           <a:prstGeom prst="rect">
@@ -5226,13 +5218,13 @@
       </p:sp>
       <p:sp>
         <p:nvSpPr>
-          <p:cNvPr id="52" name="Rectangle 51"/>
+          <p:cNvPr id="29" name="Rectangle 28"/>
           <p:cNvSpPr/>
           <p:nvPr/>
         </p:nvSpPr>
         <p:spPr>
           <a:xfrm>
-            <a:off x="1783105" y="1730996"/>
+            <a:off x="7056854" y="3636640"/>
             <a:ext cx="680444" cy="277899"/>
           </a:xfrm>
           <a:prstGeom prst="rect">
@@ -5243,8 +5235,13 @@
               <a:lumMod val="85000"/>
             </a:schemeClr>
           </a:solidFill>
-          <a:ln w="19050">
-            <a:prstDash val="lgDashDotDot"/>
+          <a:ln w="50800" cap="sq" cmpd="dbl">
+            <a:solidFill>
+              <a:schemeClr val="accent1">
+                <a:shade val="50000"/>
+              </a:schemeClr>
+            </a:solidFill>
+            <a:prstDash val="solid"/>
           </a:ln>
         </p:spPr>
         <p:style>
@@ -5280,16 +5277,74 @@
                 </a:solidFill>
                 <a:latin typeface="Calisto MT" panose="02040603050505030304" pitchFamily="18" charset="0"/>
               </a:rPr>
-              <a:t>.</a:t>
-            </a:r>
-            <a:r>
-              <a:rPr lang="fr-CA" sz="1400" dirty="0" err="1">
+              <a:t>.exe</a:t>
+            </a:r>
+            <a:endParaRPr lang="en-US" sz="1400" dirty="0">
+              <a:solidFill>
+                <a:schemeClr val="tx1"/>
+              </a:solidFill>
+              <a:latin typeface="Calisto MT" panose="02040603050505030304" pitchFamily="18" charset="0"/>
+            </a:endParaRPr>
+          </a:p>
+        </p:txBody>
+      </p:sp>
+      <p:sp>
+        <p:nvSpPr>
+          <p:cNvPr id="31" name="Rectangle 30"/>
+          <p:cNvSpPr/>
+          <p:nvPr/>
+        </p:nvSpPr>
+        <p:spPr>
+          <a:xfrm>
+            <a:off x="7056854" y="4430364"/>
+            <a:ext cx="680444" cy="277899"/>
+          </a:xfrm>
+          <a:prstGeom prst="rect">
+            <a:avLst/>
+          </a:prstGeom>
+          <a:solidFill>
+            <a:schemeClr val="bg1">
+              <a:lumMod val="85000"/>
+            </a:schemeClr>
+          </a:solidFill>
+          <a:ln w="19050">
+            <a:prstDash val="dash"/>
+          </a:ln>
+        </p:spPr>
+        <p:style>
+          <a:lnRef idx="2">
+            <a:schemeClr val="accent1">
+              <a:shade val="50000"/>
+            </a:schemeClr>
+          </a:lnRef>
+          <a:fillRef idx="1">
+            <a:schemeClr val="accent1"/>
+          </a:fillRef>
+          <a:effectRef idx="0">
+            <a:schemeClr val="accent1"/>
+          </a:effectRef>
+          <a:fontRef idx="minor">
+            <a:schemeClr val="lt1"/>
+          </a:fontRef>
+        </p:style>
+        <p:txBody>
+          <a:bodyPr rot="0" spcFirstLastPara="0" vertOverflow="overflow" horzOverflow="overflow" vert="horz" wrap="square" lIns="91440" tIns="45720" rIns="91440" bIns="45720" numCol="1" spcCol="0" rtlCol="0" fromWordArt="0" anchor="ctr" anchorCtr="0" forceAA="0" compatLnSpc="1">
+            <a:prstTxWarp prst="textNoShape">
+              <a:avLst/>
+            </a:prstTxWarp>
+            <a:noAutofit/>
+          </a:bodyPr>
+          <a:lstStyle/>
+          <a:p>
+            <a:pPr algn="ctr"/>
+            <a:r>
+              <a:rPr lang="fr-CA" sz="1400" dirty="0">
                 <a:solidFill>
                   <a:schemeClr val="tx1"/>
                 </a:solidFill>
                 <a:latin typeface="Calisto MT" panose="02040603050505030304" pitchFamily="18" charset="0"/>
               </a:rPr>
-              <a:t>exe</a:t>
+              <a:t>.dll</a:t>
             </a:r>
             <a:endParaRPr lang="en-US" sz="1400" dirty="0">
               <a:solidFill>
@@ -5332,20 +5387,20 @@
       </p:grpSpPr>
       <p:sp>
         <p:nvSpPr>
-          <p:cNvPr id="79" name="Rectangle 78"/>
+          <p:cNvPr id="4" name="Rectangle 3"/>
           <p:cNvSpPr/>
           <p:nvPr/>
         </p:nvSpPr>
         <p:spPr>
           <a:xfrm>
-            <a:off x="2774950" y="3408028"/>
-            <a:ext cx="4146550" cy="640080"/>
+            <a:off x="2774950" y="457200"/>
+            <a:ext cx="4146550" cy="3586360"/>
           </a:xfrm>
           <a:prstGeom prst="rect">
             <a:avLst/>
           </a:prstGeom>
           <a:solidFill>
-            <a:schemeClr val="accent6">
+            <a:schemeClr val="accent4">
               <a:lumMod val="40000"/>
               <a:lumOff val="60000"/>
             </a:schemeClr>
@@ -5375,7 +5430,7 @@
           <a:lstStyle/>
           <a:p>
             <a:pPr algn="ctr"/>
-            <a:endParaRPr lang="en-US" sz="1600">
+            <a:endParaRPr lang="en-US" sz="1600" dirty="0">
               <a:latin typeface="Calisto MT" panose="02040603050505030304" pitchFamily="18" charset="0"/>
             </a:endParaRPr>
           </a:p>
@@ -5383,20 +5438,20 @@
       </p:sp>
       <p:sp>
         <p:nvSpPr>
-          <p:cNvPr id="4" name="Rectangle 3"/>
+          <p:cNvPr id="5" name="Rectangle 4"/>
           <p:cNvSpPr/>
           <p:nvPr/>
         </p:nvSpPr>
         <p:spPr>
           <a:xfrm>
-            <a:off x="2774950" y="457200"/>
-            <a:ext cx="4146550" cy="2950828"/>
+            <a:off x="2774950" y="4043561"/>
+            <a:ext cx="4146550" cy="766628"/>
           </a:xfrm>
           <a:prstGeom prst="rect">
             <a:avLst/>
           </a:prstGeom>
           <a:solidFill>
-            <a:schemeClr val="accent4">
+            <a:schemeClr val="accent5">
               <a:lumMod val="40000"/>
               <a:lumOff val="60000"/>
             </a:schemeClr>
@@ -5426,7 +5481,7 @@
           <a:lstStyle/>
           <a:p>
             <a:pPr algn="ctr"/>
-            <a:endParaRPr lang="en-US" sz="1600" dirty="0">
+            <a:endParaRPr lang="en-US" sz="1600">
               <a:latin typeface="Calisto MT" panose="02040603050505030304" pitchFamily="18" charset="0"/>
             </a:endParaRPr>
           </a:p>
@@ -5434,27 +5489,24 @@
       </p:sp>
       <p:sp>
         <p:nvSpPr>
-          <p:cNvPr id="5" name="Rectangle 4"/>
+          <p:cNvPr id="6" name="Rectangle 5"/>
           <p:cNvSpPr/>
           <p:nvPr/>
         </p:nvSpPr>
         <p:spPr>
           <a:xfrm>
-            <a:off x="2774950" y="4043561"/>
-            <a:ext cx="4146550" cy="766628"/>
+            <a:off x="4316962" y="1246842"/>
+            <a:ext cx="1097280" cy="365760"/>
           </a:xfrm>
           <a:prstGeom prst="rect">
             <a:avLst/>
           </a:prstGeom>
           <a:solidFill>
-            <a:schemeClr val="accent5">
-              <a:lumMod val="40000"/>
-              <a:lumOff val="60000"/>
+            <a:schemeClr val="accent4">
+              <a:lumMod val="75000"/>
             </a:schemeClr>
           </a:solidFill>
-          <a:ln>
-            <a:noFill/>
-          </a:ln>
+          <a:ln w="19050"/>
         </p:spPr>
         <p:style>
           <a:lnRef idx="2">
@@ -5477,56 +5529,8 @@
           <a:lstStyle/>
           <a:p>
             <a:pPr algn="ctr"/>
-            <a:endParaRPr lang="en-US" sz="1600">
-              <a:latin typeface="Calisto MT" panose="02040603050505030304" pitchFamily="18" charset="0"/>
-            </a:endParaRPr>
-          </a:p>
-        </p:txBody>
-      </p:sp>
-      <p:sp>
-        <p:nvSpPr>
-          <p:cNvPr id="6" name="Rectangle 5"/>
-          <p:cNvSpPr/>
-          <p:nvPr/>
-        </p:nvSpPr>
-        <p:spPr>
-          <a:xfrm>
-            <a:off x="4316962" y="1246842"/>
-            <a:ext cx="1097280" cy="365760"/>
-          </a:xfrm>
-          <a:prstGeom prst="rect">
-            <a:avLst/>
-          </a:prstGeom>
-          <a:solidFill>
-            <a:schemeClr val="accent4">
-              <a:lumMod val="75000"/>
-            </a:schemeClr>
-          </a:solidFill>
-          <a:ln w="19050"/>
-        </p:spPr>
-        <p:style>
-          <a:lnRef idx="2">
-            <a:schemeClr val="accent1">
-              <a:shade val="50000"/>
-            </a:schemeClr>
-          </a:lnRef>
-          <a:fillRef idx="1">
-            <a:schemeClr val="accent1"/>
-          </a:fillRef>
-          <a:effectRef idx="0">
-            <a:schemeClr val="accent1"/>
-          </a:effectRef>
-          <a:fontRef idx="minor">
-            <a:schemeClr val="lt1"/>
-          </a:fontRef>
-        </p:style>
-        <p:txBody>
-          <a:bodyPr rtlCol="0" anchor="ctr"/>
-          <a:lstStyle/>
-          <a:p>
-            <a:pPr algn="ctr"/>
-            <a:r>
-              <a:rPr lang="fr-CA" sz="1400" dirty="0" err="1">
+            <a:r>
+              <a:rPr lang="fr-CA" sz="1400" dirty="0">
                 <a:latin typeface="Calisto MT" panose="02040603050505030304" pitchFamily="18" charset="0"/>
               </a:rPr>
               <a:t>Analysis</a:t>
@@ -5768,8 +5772,13 @@
               <a:lumMod val="75000"/>
             </a:schemeClr>
           </a:solidFill>
-          <a:ln w="19050">
-            <a:prstDash val="lgDashDotDot"/>
+          <a:ln w="50800" cap="sq" cmpd="dbl">
+            <a:solidFill>
+              <a:schemeClr val="accent1">
+                <a:shade val="50000"/>
+              </a:schemeClr>
+            </a:solidFill>
+            <a:prstDash val="solid"/>
           </a:ln>
         </p:spPr>
         <p:style>
@@ -5890,73 +5899,19 @@
           </a:fontRef>
         </p:style>
       </p:cxnSp>
-      <p:sp>
-        <p:nvSpPr>
-          <p:cNvPr id="16" name="Rectangle 15"/>
-          <p:cNvSpPr/>
-          <p:nvPr/>
-        </p:nvSpPr>
-        <p:spPr>
-          <a:xfrm>
-            <a:off x="3027854" y="3559346"/>
-            <a:ext cx="1097280" cy="365760"/>
-          </a:xfrm>
-          <a:prstGeom prst="rect">
-            <a:avLst/>
-          </a:prstGeom>
-          <a:solidFill>
-            <a:schemeClr val="accent4">
-              <a:lumMod val="75000"/>
-            </a:schemeClr>
-          </a:solidFill>
-          <a:ln w="19050"/>
-        </p:spPr>
-        <p:style>
-          <a:lnRef idx="2">
-            <a:schemeClr val="accent1">
-              <a:shade val="50000"/>
-            </a:schemeClr>
-          </a:lnRef>
-          <a:fillRef idx="1">
-            <a:schemeClr val="accent1"/>
-          </a:fillRef>
-          <a:effectRef idx="0">
-            <a:schemeClr val="accent1"/>
-          </a:effectRef>
-          <a:fontRef idx="minor">
-            <a:schemeClr val="lt1"/>
-          </a:fontRef>
-        </p:style>
-        <p:txBody>
-          <a:bodyPr rtlCol="0" anchor="ctr"/>
-          <a:lstStyle/>
-          <a:p>
-            <a:pPr algn="ctr"/>
-            <a:r>
-              <a:rPr lang="fr-CA" sz="1400" dirty="0">
-                <a:latin typeface="Calisto MT" panose="02040603050505030304" pitchFamily="18" charset="0"/>
-              </a:rPr>
-              <a:t>Utils</a:t>
-            </a:r>
-            <a:endParaRPr lang="en-US" sz="1400" dirty="0">
-              <a:latin typeface="Calisto MT" panose="02040603050505030304" pitchFamily="18" charset="0"/>
-            </a:endParaRPr>
-          </a:p>
-        </p:txBody>
-      </p:sp>
       <p:cxnSp>
         <p:nvCxnSpPr>
           <p:cNvPr id="17" name="Connector: Elbow 16"/>
           <p:cNvCxnSpPr>
+            <a:cxnSpLocks/>
             <a:stCxn id="8" idx="2"/>
-            <a:endCxn id="16" idx="0"/>
           </p:cNvCxnSpPr>
           <p:nvPr/>
         </p:nvCxnSpPr>
         <p:spPr>
           <a:xfrm rot="5400000">
-            <a:off x="3462989" y="3445813"/>
-            <a:ext cx="227038" cy="28"/>
+            <a:off x="3475515" y="3433287"/>
+            <a:ext cx="201986" cy="28"/>
           </a:xfrm>
           <a:prstGeom prst="bentConnector3">
             <a:avLst/>
@@ -6200,7 +6155,7 @@
           <a:p>
             <a:pPr algn="ctr"/>
             <a:r>
-              <a:rPr lang="fr-CA" sz="1400" dirty="0" err="1">
+              <a:rPr lang="fr-CA" sz="1400" dirty="0">
                 <a:latin typeface="Calisto MT" panose="02040603050505030304" pitchFamily="18" charset="0"/>
               </a:rPr>
               <a:t>JUCEUtils</a:t>
@@ -6215,6 +6170,7 @@
         <p:nvCxnSpPr>
           <p:cNvPr id="32" name="Straight Arrow Connector 31"/>
           <p:cNvCxnSpPr>
+            <a:cxnSpLocks/>
             <a:stCxn id="24" idx="2"/>
             <a:endCxn id="30" idx="0"/>
           </p:cNvCxnSpPr>
@@ -6292,104 +6248,6 @@
       </p:cxnSp>
       <p:sp>
         <p:nvSpPr>
-          <p:cNvPr id="41" name="TextBox 40"/>
-          <p:cNvSpPr txBox="1"/>
-          <p:nvPr/>
-        </p:nvSpPr>
-        <p:spPr>
-          <a:xfrm>
-            <a:off x="3289300" y="5073650"/>
-            <a:ext cx="3568700" cy="830997"/>
-          </a:xfrm>
-          <a:prstGeom prst="rect">
-            <a:avLst/>
-          </a:prstGeom>
-          <a:noFill/>
-        </p:spPr>
-        <p:txBody>
-          <a:bodyPr wrap="square" rtlCol="0">
-            <a:spAutoFit/>
-          </a:bodyPr>
-          <a:lstStyle/>
-          <a:p>
-            <a:r>
-              <a:rPr lang="fr-CA" sz="1600" dirty="0" err="1">
-                <a:latin typeface="Calisto MT" panose="02040603050505030304" pitchFamily="18" charset="0"/>
-              </a:rPr>
-              <a:t>Add</a:t>
-            </a:r>
-            <a:r>
-              <a:rPr lang="fr-CA" sz="1600" dirty="0">
-                <a:latin typeface="Calisto MT" panose="02040603050505030304" pitchFamily="18" charset="0"/>
-              </a:rPr>
-              <a:t> </a:t>
-            </a:r>
-            <a:r>
-              <a:rPr lang="fr-CA" sz="1600" dirty="0" err="1">
-                <a:latin typeface="Calisto MT" panose="02040603050505030304" pitchFamily="18" charset="0"/>
-              </a:rPr>
-              <a:t>Analysis</a:t>
-            </a:r>
-            <a:endParaRPr lang="fr-CA" sz="1600" dirty="0">
-              <a:latin typeface="Calisto MT" panose="02040603050505030304" pitchFamily="18" charset="0"/>
-            </a:endParaRPr>
-          </a:p>
-          <a:p>
-            <a:r>
-              <a:rPr lang="fr-CA" sz="1600" dirty="0" err="1">
-                <a:latin typeface="Calisto MT" panose="02040603050505030304" pitchFamily="18" charset="0"/>
-              </a:rPr>
-              <a:t>Add</a:t>
-            </a:r>
-            <a:r>
-              <a:rPr lang="fr-CA" sz="1600" dirty="0">
-                <a:latin typeface="Calisto MT" panose="02040603050505030304" pitchFamily="18" charset="0"/>
-              </a:rPr>
-              <a:t> </a:t>
-            </a:r>
-            <a:r>
-              <a:rPr lang="fr-CA" sz="1600" dirty="0" err="1">
-                <a:latin typeface="Calisto MT" panose="02040603050505030304" pitchFamily="18" charset="0"/>
-              </a:rPr>
-              <a:t>Pluggins</a:t>
-            </a:r>
-            <a:endParaRPr lang="fr-CA" sz="1600" dirty="0">
-              <a:latin typeface="Calisto MT" panose="02040603050505030304" pitchFamily="18" charset="0"/>
-            </a:endParaRPr>
-          </a:p>
-          <a:p>
-            <a:r>
-              <a:rPr lang="fr-CA" sz="1600" dirty="0">
-                <a:latin typeface="Calisto MT" panose="02040603050505030304" pitchFamily="18" charset="0"/>
-              </a:rPr>
-              <a:t>Move Utils out of </a:t>
-            </a:r>
-            <a:r>
-              <a:rPr lang="fr-CA" sz="1600" dirty="0" err="1">
-                <a:latin typeface="Calisto MT" panose="02040603050505030304" pitchFamily="18" charset="0"/>
-              </a:rPr>
-              <a:t>Stretto</a:t>
-            </a:r>
-            <a:r>
-              <a:rPr lang="fr-CA" sz="1600" dirty="0">
-                <a:latin typeface="Calisto MT" panose="02040603050505030304" pitchFamily="18" charset="0"/>
-              </a:rPr>
-              <a:t> </a:t>
-            </a:r>
-            <a:r>
-              <a:rPr lang="fr-CA" sz="1600" dirty="0" err="1">
-                <a:latin typeface="Calisto MT" panose="02040603050505030304" pitchFamily="18" charset="0"/>
-              </a:rPr>
-              <a:t>project</a:t>
-            </a:r>
-            <a:endParaRPr lang="en-US" sz="1600" dirty="0">
-              <a:latin typeface="Calisto MT" panose="02040603050505030304" pitchFamily="18" charset="0"/>
-            </a:endParaRPr>
-          </a:p>
-        </p:txBody>
-      </p:sp>
-      <p:sp>
-        <p:nvSpPr>
           <p:cNvPr id="33" name="Rectangle 32"/>
           <p:cNvSpPr/>
           <p:nvPr/>
@@ -6407,8 +6265,13 @@
               <a:lumMod val="75000"/>
             </a:schemeClr>
           </a:solidFill>
-          <a:ln w="19050">
-            <a:prstDash val="lgDashDotDot"/>
+          <a:ln w="50800" cap="sq" cmpd="dbl">
+            <a:solidFill>
+              <a:schemeClr val="accent1">
+                <a:shade val="50000"/>
+              </a:schemeClr>
+            </a:solidFill>
+            <a:prstDash val="solid"/>
           </a:ln>
         </p:spPr>
         <p:style>
@@ -6547,9 +6410,7 @@
               <a:lumMod val="75000"/>
             </a:schemeClr>
           </a:solidFill>
-          <a:ln w="19050">
-            <a:prstDash val="dash"/>
-          </a:ln>
+          <a:ln w="19050"/>
         </p:spPr>
         <p:style>
           <a:lnRef idx="2">
@@ -6573,10 +6434,10 @@
           <a:p>
             <a:pPr algn="ctr"/>
             <a:r>
-              <a:rPr lang="fr-CA" sz="1400" dirty="0" err="1">
+              <a:rPr lang="fr-CA" sz="1400" dirty="0">
                 <a:latin typeface="Calisto MT" panose="02040603050505030304" pitchFamily="18" charset="0"/>
               </a:rPr>
-              <a:t>Pluggins</a:t>
+              <a:t>PluginAPI</a:t>
             </a:r>
             <a:endParaRPr lang="en-US" sz="1400" dirty="0">
               <a:latin typeface="Calisto MT" panose="02040603050505030304" pitchFamily="18" charset="0"/>
@@ -6686,7 +6547,7 @@
           <a:lstStyle/>
           <a:p>
             <a:r>
-              <a:rPr lang="fr-CA" sz="1050" dirty="0" err="1">
+              <a:rPr lang="fr-CA" sz="1050" dirty="0">
                 <a:latin typeface="Calisto MT" panose="02040603050505030304" pitchFamily="18" charset="0"/>
               </a:rPr>
               <a:t>Stretto</a:t>
@@ -6720,16 +6581,10 @@
           <a:lstStyle/>
           <a:p>
             <a:r>
-              <a:rPr lang="fr-CA" sz="1050" dirty="0" err="1">
-                <a:latin typeface="Calisto MT" panose="02040603050505030304" pitchFamily="18" charset="0"/>
-              </a:rPr>
-              <a:t>Third</a:t>
-            </a:r>
-            <a:r>
               <a:rPr lang="fr-CA" sz="1050" dirty="0">
                 <a:latin typeface="Calisto MT" panose="02040603050505030304" pitchFamily="18" charset="0"/>
               </a:rPr>
-              <a:t>-Party</a:t>
+              <a:t>Third-Party</a:t>
             </a:r>
             <a:endParaRPr lang="en-US" sz="1050" dirty="0">
               <a:latin typeface="Calisto MT" panose="02040603050505030304" pitchFamily="18" charset="0"/>
@@ -6776,27 +6631,85 @@
           </a:fontRef>
         </p:style>
       </p:cxnSp>
+      <p:sp>
+        <p:nvSpPr>
+          <p:cNvPr id="37" name="Rectangle 36"/>
+          <p:cNvSpPr/>
+          <p:nvPr/>
+        </p:nvSpPr>
+        <p:spPr>
+          <a:xfrm>
+            <a:off x="3027854" y="678721"/>
+            <a:ext cx="1097280" cy="365760"/>
+          </a:xfrm>
+          <a:prstGeom prst="rect">
+            <a:avLst/>
+          </a:prstGeom>
+          <a:solidFill>
+            <a:schemeClr val="accent4">
+              <a:lumMod val="75000"/>
+            </a:schemeClr>
+          </a:solidFill>
+          <a:ln w="19050">
+            <a:prstDash val="dash"/>
+          </a:ln>
+        </p:spPr>
+        <p:style>
+          <a:lnRef idx="2">
+            <a:schemeClr val="accent1">
+              <a:shade val="50000"/>
+            </a:schemeClr>
+          </a:lnRef>
+          <a:fillRef idx="1">
+            <a:schemeClr val="accent1"/>
+          </a:fillRef>
+          <a:effectRef idx="0">
+            <a:schemeClr val="accent1"/>
+          </a:effectRef>
+          <a:fontRef idx="minor">
+            <a:schemeClr val="lt1"/>
+          </a:fontRef>
+        </p:style>
+        <p:txBody>
+          <a:bodyPr rtlCol="0" anchor="ctr"/>
+          <a:lstStyle/>
+          <a:p>
+            <a:pPr algn="ctr"/>
+            <a:r>
+              <a:rPr lang="fr-CA" sz="1200" dirty="0">
+                <a:latin typeface="Calisto MT" panose="02040603050505030304" pitchFamily="18" charset="0"/>
+              </a:rPr>
+              <a:t>BuiltinPlugin</a:t>
+            </a:r>
+            <a:endParaRPr lang="en-US" sz="1200" dirty="0">
+              <a:latin typeface="Calisto MT" panose="02040603050505030304" pitchFamily="18" charset="0"/>
+            </a:endParaRPr>
+          </a:p>
+        </p:txBody>
+      </p:sp>
       <p:cxnSp>
         <p:nvCxnSpPr>
-          <p:cNvPr id="80" name="Straight Connector 79"/>
+          <p:cNvPr id="38" name="Straight Arrow Connector 37"/>
           <p:cNvCxnSpPr>
             <a:cxnSpLocks/>
+            <a:stCxn id="37" idx="2"/>
+            <a:endCxn id="50" idx="0"/>
           </p:cNvCxnSpPr>
           <p:nvPr/>
         </p:nvCxnSpPr>
         <p:spPr>
           <a:xfrm>
-            <a:off x="2792327" y="3410272"/>
-            <a:ext cx="4146550" cy="1"/>
-          </a:xfrm>
-          <a:prstGeom prst="line">
-            <a:avLst/>
-          </a:prstGeom>
-          <a:ln w="12700">
+            <a:off x="3576494" y="1044481"/>
+            <a:ext cx="0" cy="772124"/>
+          </a:xfrm>
+          <a:prstGeom prst="straightConnector1">
+            <a:avLst/>
+          </a:prstGeom>
+          <a:ln w="19050">
             <a:solidFill>
               <a:schemeClr val="tx1"/>
             </a:solidFill>
-            <a:prstDash val="lgDash"/>
+            <a:tailEnd type="triangle"/>
           </a:ln>
         </p:spPr>
         <p:style>
@@ -6816,47 +6729,13 @@
       </p:cxnSp>
       <p:sp>
         <p:nvSpPr>
-          <p:cNvPr id="82" name="TextBox 81"/>
-          <p:cNvSpPr txBox="1"/>
-          <p:nvPr/>
-        </p:nvSpPr>
-        <p:spPr>
-          <a:xfrm>
-            <a:off x="2720829" y="3360854"/>
-            <a:ext cx="1225899" cy="261610"/>
-          </a:xfrm>
-          <a:prstGeom prst="rect">
-            <a:avLst/>
-          </a:prstGeom>
-          <a:noFill/>
-        </p:spPr>
-        <p:txBody>
-          <a:bodyPr wrap="square" rtlCol="0">
-            <a:spAutoFit/>
-          </a:bodyPr>
-          <a:lstStyle/>
-          <a:p>
-            <a:r>
-              <a:rPr lang="fr-CA" sz="1050" dirty="0">
-                <a:latin typeface="Calisto MT" panose="02040603050505030304" pitchFamily="18" charset="0"/>
-              </a:rPr>
-              <a:t>FXG</a:t>
-            </a:r>
-            <a:endParaRPr lang="en-US" sz="1050" dirty="0">
-              <a:latin typeface="Calisto MT" panose="02040603050505030304" pitchFamily="18" charset="0"/>
-            </a:endParaRPr>
-          </a:p>
-        </p:txBody>
-      </p:sp>
-      <p:sp>
-        <p:nvSpPr>
-          <p:cNvPr id="83" name="Rectangle 82"/>
+          <p:cNvPr id="42" name="Rectangle 41"/>
           <p:cNvSpPr/>
           <p:nvPr/>
         </p:nvSpPr>
         <p:spPr>
           <a:xfrm>
-            <a:off x="1783105" y="2127858"/>
+            <a:off x="7056854" y="4033502"/>
             <a:ext cx="680444" cy="277899"/>
           </a:xfrm>
           <a:prstGeom prst="rect">
@@ -6917,13 +6796,13 @@
       </p:sp>
       <p:sp>
         <p:nvSpPr>
-          <p:cNvPr id="84" name="Rectangle 83"/>
+          <p:cNvPr id="43" name="Rectangle 42"/>
           <p:cNvSpPr/>
           <p:nvPr/>
         </p:nvSpPr>
         <p:spPr>
           <a:xfrm>
-            <a:off x="1783105" y="1730996"/>
+            <a:off x="7056854" y="3636640"/>
             <a:ext cx="680444" cy="277899"/>
           </a:xfrm>
           <a:prstGeom prst="rect">
@@ -6934,8 +6813,13 @@
               <a:lumMod val="85000"/>
             </a:schemeClr>
           </a:solidFill>
-          <a:ln w="19050">
-            <a:prstDash val="lgDashDotDot"/>
+          <a:ln w="50800" cap="sq" cmpd="dbl">
+            <a:solidFill>
+              <a:schemeClr val="accent1">
+                <a:shade val="50000"/>
+              </a:schemeClr>
+            </a:solidFill>
+            <a:prstDash val="solid"/>
           </a:ln>
         </p:spPr>
         <p:style>
@@ -6971,16 +6855,7 @@
                 </a:solidFill>
                 <a:latin typeface="Calisto MT" panose="02040603050505030304" pitchFamily="18" charset="0"/>
               </a:rPr>
-              <a:t>.</a:t>
-            </a:r>
-            <a:r>
-              <a:rPr lang="fr-CA" sz="1400" dirty="0" err="1">
-                <a:solidFill>
-                  <a:schemeClr val="tx1"/>
-                </a:solidFill>
-                <a:latin typeface="Calisto MT" panose="02040603050505030304" pitchFamily="18" charset="0"/>
-              </a:rPr>
-              <a:t>exe</a:t>
+              <a:t>.exe</a:t>
             </a:r>
             <a:endParaRPr lang="en-US" sz="1400" dirty="0">
               <a:solidFill>
@@ -6993,13 +6868,13 @@
       </p:sp>
       <p:sp>
         <p:nvSpPr>
-          <p:cNvPr id="85" name="Rectangle 84"/>
+          <p:cNvPr id="44" name="Rectangle 43"/>
           <p:cNvSpPr/>
           <p:nvPr/>
         </p:nvSpPr>
         <p:spPr>
           <a:xfrm>
-            <a:off x="1783105" y="2524720"/>
+            <a:off x="7056854" y="4430364"/>
             <a:ext cx="680444" cy="277899"/>
           </a:xfrm>
           <a:prstGeom prst="rect">
@@ -7058,10 +6933,1817 @@
           </a:p>
         </p:txBody>
       </p:sp>
+      <p:sp>
+        <p:nvSpPr>
+          <p:cNvPr id="45" name="Rectangle 44"/>
+          <p:cNvSpPr/>
+          <p:nvPr/>
+        </p:nvSpPr>
+        <p:spPr>
+          <a:xfrm>
+            <a:off x="3027854" y="3532743"/>
+            <a:ext cx="1097280" cy="365760"/>
+          </a:xfrm>
+          <a:prstGeom prst="rect">
+            <a:avLst/>
+          </a:prstGeom>
+          <a:solidFill>
+            <a:schemeClr val="accent4">
+              <a:lumMod val="75000"/>
+            </a:schemeClr>
+          </a:solidFill>
+          <a:ln w="19050"/>
+        </p:spPr>
+        <p:style>
+          <a:lnRef idx="2">
+            <a:schemeClr val="accent1">
+              <a:shade val="50000"/>
+            </a:schemeClr>
+          </a:lnRef>
+          <a:fillRef idx="1">
+            <a:schemeClr val="accent1"/>
+          </a:fillRef>
+          <a:effectRef idx="0">
+            <a:schemeClr val="accent1"/>
+          </a:effectRef>
+          <a:fontRef idx="minor">
+            <a:schemeClr val="lt1"/>
+          </a:fontRef>
+        </p:style>
+        <p:txBody>
+          <a:bodyPr rtlCol="0" anchor="ctr"/>
+          <a:lstStyle/>
+          <a:p>
+            <a:pPr algn="ctr"/>
+            <a:r>
+              <a:rPr lang="fr-CA" sz="1400" dirty="0">
+                <a:latin typeface="Calisto MT" panose="02040603050505030304" pitchFamily="18" charset="0"/>
+              </a:rPr>
+              <a:t>Utils</a:t>
+            </a:r>
+            <a:endParaRPr lang="en-US" sz="1400" dirty="0">
+              <a:latin typeface="Calisto MT" panose="02040603050505030304" pitchFamily="18" charset="0"/>
+            </a:endParaRPr>
+          </a:p>
+        </p:txBody>
+      </p:sp>
     </p:spTree>
     <p:extLst>
       <p:ext uri="{BB962C8B-B14F-4D97-AF65-F5344CB8AC3E}">
         <p14:creationId xmlns:p14="http://schemas.microsoft.com/office/powerpoint/2010/main" val="1767778155"/>
+      </p:ext>
+    </p:extLst>
+  </p:cSld>
+  <p:clrMapOvr>
+    <a:masterClrMapping/>
+  </p:clrMapOvr>
+</p:sld>
+</file>
+
+<file path=ppt/slides/slide4.xml><?xml version="1.0" encoding="utf-8"?>
+<p:sld xmlns:a="http://schemas.openxmlformats.org/drawingml/2006/main" xmlns:r="http://schemas.openxmlformats.org/officeDocument/2006/relationships" xmlns:p="http://schemas.openxmlformats.org/presentationml/2006/main">
+  <p:cSld>
+    <p:spTree>
+      <p:nvGrpSpPr>
+        <p:cNvPr id="1" name=""/>
+        <p:cNvGrpSpPr/>
+        <p:nvPr/>
+      </p:nvGrpSpPr>
+      <p:grpSpPr>
+        <a:xfrm>
+          <a:off x="0" y="0"/>
+          <a:ext cx="0" cy="0"/>
+          <a:chOff x="0" y="0"/>
+          <a:chExt cx="0" cy="0"/>
+        </a:xfrm>
+      </p:grpSpPr>
+      <p:sp>
+        <p:nvSpPr>
+          <p:cNvPr id="4" name="Rectangle 3"/>
+          <p:cNvSpPr/>
+          <p:nvPr/>
+        </p:nvSpPr>
+        <p:spPr>
+          <a:xfrm>
+            <a:off x="2774950" y="457200"/>
+            <a:ext cx="4146550" cy="2983692"/>
+          </a:xfrm>
+          <a:prstGeom prst="rect">
+            <a:avLst/>
+          </a:prstGeom>
+          <a:solidFill>
+            <a:schemeClr val="accent4">
+              <a:lumMod val="40000"/>
+              <a:lumOff val="60000"/>
+            </a:schemeClr>
+          </a:solidFill>
+          <a:ln>
+            <a:noFill/>
+          </a:ln>
+        </p:spPr>
+        <p:style>
+          <a:lnRef idx="2">
+            <a:schemeClr val="accent1">
+              <a:shade val="50000"/>
+            </a:schemeClr>
+          </a:lnRef>
+          <a:fillRef idx="1">
+            <a:schemeClr val="accent1"/>
+          </a:fillRef>
+          <a:effectRef idx="0">
+            <a:schemeClr val="accent1"/>
+          </a:effectRef>
+          <a:fontRef idx="minor">
+            <a:schemeClr val="lt1"/>
+          </a:fontRef>
+        </p:style>
+        <p:txBody>
+          <a:bodyPr rtlCol="0" anchor="ctr"/>
+          <a:lstStyle/>
+          <a:p>
+            <a:pPr algn="ctr"/>
+            <a:endParaRPr lang="en-US" sz="1600" dirty="0">
+              <a:latin typeface="Calisto MT" panose="02040603050505030304" pitchFamily="18" charset="0"/>
+            </a:endParaRPr>
+          </a:p>
+        </p:txBody>
+      </p:sp>
+      <p:sp>
+        <p:nvSpPr>
+          <p:cNvPr id="79" name="Rectangle 78"/>
+          <p:cNvSpPr/>
+          <p:nvPr/>
+        </p:nvSpPr>
+        <p:spPr>
+          <a:xfrm>
+            <a:off x="2774950" y="3386468"/>
+            <a:ext cx="4146550" cy="661640"/>
+          </a:xfrm>
+          <a:prstGeom prst="rect">
+            <a:avLst/>
+          </a:prstGeom>
+          <a:solidFill>
+            <a:schemeClr val="accent6">
+              <a:lumMod val="40000"/>
+              <a:lumOff val="60000"/>
+            </a:schemeClr>
+          </a:solidFill>
+          <a:ln>
+            <a:noFill/>
+          </a:ln>
+        </p:spPr>
+        <p:style>
+          <a:lnRef idx="2">
+            <a:schemeClr val="accent1">
+              <a:shade val="50000"/>
+            </a:schemeClr>
+          </a:lnRef>
+          <a:fillRef idx="1">
+            <a:schemeClr val="accent1"/>
+          </a:fillRef>
+          <a:effectRef idx="0">
+            <a:schemeClr val="accent1"/>
+          </a:effectRef>
+          <a:fontRef idx="minor">
+            <a:schemeClr val="lt1"/>
+          </a:fontRef>
+        </p:style>
+        <p:txBody>
+          <a:bodyPr rtlCol="0" anchor="ctr"/>
+          <a:lstStyle/>
+          <a:p>
+            <a:pPr algn="ctr"/>
+            <a:endParaRPr lang="en-US" sz="1600">
+              <a:latin typeface="Calisto MT" panose="02040603050505030304" pitchFamily="18" charset="0"/>
+            </a:endParaRPr>
+          </a:p>
+        </p:txBody>
+      </p:sp>
+      <p:sp>
+        <p:nvSpPr>
+          <p:cNvPr id="5" name="Rectangle 4"/>
+          <p:cNvSpPr/>
+          <p:nvPr/>
+        </p:nvSpPr>
+        <p:spPr>
+          <a:xfrm>
+            <a:off x="2774950" y="4043561"/>
+            <a:ext cx="4146550" cy="766628"/>
+          </a:xfrm>
+          <a:prstGeom prst="rect">
+            <a:avLst/>
+          </a:prstGeom>
+          <a:solidFill>
+            <a:schemeClr val="accent5">
+              <a:lumMod val="40000"/>
+              <a:lumOff val="60000"/>
+            </a:schemeClr>
+          </a:solidFill>
+          <a:ln>
+            <a:noFill/>
+          </a:ln>
+        </p:spPr>
+        <p:style>
+          <a:lnRef idx="2">
+            <a:schemeClr val="accent1">
+              <a:shade val="50000"/>
+            </a:schemeClr>
+          </a:lnRef>
+          <a:fillRef idx="1">
+            <a:schemeClr val="accent1"/>
+          </a:fillRef>
+          <a:effectRef idx="0">
+            <a:schemeClr val="accent1"/>
+          </a:effectRef>
+          <a:fontRef idx="minor">
+            <a:schemeClr val="lt1"/>
+          </a:fontRef>
+        </p:style>
+        <p:txBody>
+          <a:bodyPr rtlCol="0" anchor="ctr"/>
+          <a:lstStyle/>
+          <a:p>
+            <a:pPr algn="ctr"/>
+            <a:endParaRPr lang="en-US" sz="1600">
+              <a:latin typeface="Calisto MT" panose="02040603050505030304" pitchFamily="18" charset="0"/>
+            </a:endParaRPr>
+          </a:p>
+        </p:txBody>
+      </p:sp>
+      <p:sp>
+        <p:nvSpPr>
+          <p:cNvPr id="6" name="Rectangle 5"/>
+          <p:cNvSpPr/>
+          <p:nvPr/>
+        </p:nvSpPr>
+        <p:spPr>
+          <a:xfrm>
+            <a:off x="4316962" y="1246842"/>
+            <a:ext cx="1097280" cy="365760"/>
+          </a:xfrm>
+          <a:prstGeom prst="rect">
+            <a:avLst/>
+          </a:prstGeom>
+          <a:solidFill>
+            <a:schemeClr val="accent4">
+              <a:lumMod val="75000"/>
+            </a:schemeClr>
+          </a:solidFill>
+          <a:ln w="19050"/>
+        </p:spPr>
+        <p:style>
+          <a:lnRef idx="2">
+            <a:schemeClr val="accent1">
+              <a:shade val="50000"/>
+            </a:schemeClr>
+          </a:lnRef>
+          <a:fillRef idx="1">
+            <a:schemeClr val="accent1"/>
+          </a:fillRef>
+          <a:effectRef idx="0">
+            <a:schemeClr val="accent1"/>
+          </a:effectRef>
+          <a:fontRef idx="minor">
+            <a:schemeClr val="lt1"/>
+          </a:fontRef>
+        </p:style>
+        <p:txBody>
+          <a:bodyPr rtlCol="0" anchor="ctr"/>
+          <a:lstStyle/>
+          <a:p>
+            <a:pPr algn="ctr"/>
+            <a:r>
+              <a:rPr lang="fr-CA" sz="1400" dirty="0">
+                <a:latin typeface="Calisto MT" panose="02040603050505030304" pitchFamily="18" charset="0"/>
+              </a:rPr>
+              <a:t>Analysis</a:t>
+            </a:r>
+            <a:endParaRPr lang="en-US" sz="1400" dirty="0">
+              <a:latin typeface="Calisto MT" panose="02040603050505030304" pitchFamily="18" charset="0"/>
+            </a:endParaRPr>
+          </a:p>
+        </p:txBody>
+      </p:sp>
+      <p:sp>
+        <p:nvSpPr>
+          <p:cNvPr id="7" name="Rectangle 6"/>
+          <p:cNvSpPr/>
+          <p:nvPr/>
+        </p:nvSpPr>
+        <p:spPr>
+          <a:xfrm>
+            <a:off x="3027854" y="2382799"/>
+            <a:ext cx="1097280" cy="365760"/>
+          </a:xfrm>
+          <a:prstGeom prst="rect">
+            <a:avLst/>
+          </a:prstGeom>
+          <a:solidFill>
+            <a:schemeClr val="accent4">
+              <a:lumMod val="75000"/>
+            </a:schemeClr>
+          </a:solidFill>
+          <a:ln w="19050"/>
+        </p:spPr>
+        <p:style>
+          <a:lnRef idx="2">
+            <a:schemeClr val="accent1">
+              <a:shade val="50000"/>
+            </a:schemeClr>
+          </a:lnRef>
+          <a:fillRef idx="1">
+            <a:schemeClr val="accent1"/>
+          </a:fillRef>
+          <a:effectRef idx="0">
+            <a:schemeClr val="accent1"/>
+          </a:effectRef>
+          <a:fontRef idx="minor">
+            <a:schemeClr val="lt1"/>
+          </a:fontRef>
+        </p:style>
+        <p:txBody>
+          <a:bodyPr rtlCol="0" anchor="ctr"/>
+          <a:lstStyle/>
+          <a:p>
+            <a:pPr algn="ctr"/>
+            <a:r>
+              <a:rPr lang="fr-CA" sz="1400" dirty="0">
+                <a:latin typeface="Calisto MT" panose="02040603050505030304" pitchFamily="18" charset="0"/>
+              </a:rPr>
+              <a:t>Piece</a:t>
+            </a:r>
+            <a:endParaRPr lang="en-US" sz="1400" dirty="0">
+              <a:latin typeface="Calisto MT" panose="02040603050505030304" pitchFamily="18" charset="0"/>
+            </a:endParaRPr>
+          </a:p>
+        </p:txBody>
+      </p:sp>
+      <p:sp>
+        <p:nvSpPr>
+          <p:cNvPr id="8" name="Rectangle 7"/>
+          <p:cNvSpPr/>
+          <p:nvPr/>
+        </p:nvSpPr>
+        <p:spPr>
+          <a:xfrm>
+            <a:off x="3027882" y="2966548"/>
+            <a:ext cx="1097280" cy="365760"/>
+          </a:xfrm>
+          <a:prstGeom prst="rect">
+            <a:avLst/>
+          </a:prstGeom>
+          <a:solidFill>
+            <a:schemeClr val="accent4">
+              <a:lumMod val="75000"/>
+            </a:schemeClr>
+          </a:solidFill>
+          <a:ln w="19050"/>
+        </p:spPr>
+        <p:style>
+          <a:lnRef idx="2">
+            <a:schemeClr val="accent1">
+              <a:shade val="50000"/>
+            </a:schemeClr>
+          </a:lnRef>
+          <a:fillRef idx="1">
+            <a:schemeClr val="accent1"/>
+          </a:fillRef>
+          <a:effectRef idx="0">
+            <a:schemeClr val="accent1"/>
+          </a:effectRef>
+          <a:fontRef idx="minor">
+            <a:schemeClr val="lt1"/>
+          </a:fontRef>
+        </p:style>
+        <p:txBody>
+          <a:bodyPr rtlCol="0" anchor="ctr"/>
+          <a:lstStyle/>
+          <a:p>
+            <a:pPr algn="ctr"/>
+            <a:r>
+              <a:rPr lang="fr-CA" sz="1400" dirty="0">
+                <a:latin typeface="Calisto MT" panose="02040603050505030304" pitchFamily="18" charset="0"/>
+              </a:rPr>
+              <a:t>Theory</a:t>
+            </a:r>
+            <a:endParaRPr lang="en-US" sz="1400" dirty="0">
+              <a:latin typeface="Calisto MT" panose="02040603050505030304" pitchFamily="18" charset="0"/>
+            </a:endParaRPr>
+          </a:p>
+        </p:txBody>
+      </p:sp>
+      <p:sp>
+        <p:nvSpPr>
+          <p:cNvPr id="9" name="Rectangle 8"/>
+          <p:cNvSpPr/>
+          <p:nvPr/>
+        </p:nvSpPr>
+        <p:spPr>
+          <a:xfrm>
+            <a:off x="4320552" y="4244988"/>
+            <a:ext cx="1097280" cy="365760"/>
+          </a:xfrm>
+          <a:prstGeom prst="rect">
+            <a:avLst/>
+          </a:prstGeom>
+          <a:solidFill>
+            <a:schemeClr val="accent5">
+              <a:lumMod val="75000"/>
+            </a:schemeClr>
+          </a:solidFill>
+          <a:ln w="19050"/>
+        </p:spPr>
+        <p:style>
+          <a:lnRef idx="3">
+            <a:schemeClr val="lt1"/>
+          </a:lnRef>
+          <a:fillRef idx="1">
+            <a:schemeClr val="accent6"/>
+          </a:fillRef>
+          <a:effectRef idx="1">
+            <a:schemeClr val="accent6"/>
+          </a:effectRef>
+          <a:fontRef idx="minor">
+            <a:schemeClr val="lt1"/>
+          </a:fontRef>
+        </p:style>
+        <p:txBody>
+          <a:bodyPr rtlCol="0" anchor="ctr"/>
+          <a:lstStyle/>
+          <a:p>
+            <a:pPr algn="ctr"/>
+            <a:r>
+              <a:rPr lang="fr-CA" sz="1400" dirty="0">
+                <a:latin typeface="Calisto MT" panose="02040603050505030304" pitchFamily="18" charset="0"/>
+              </a:rPr>
+              <a:t>JUCE</a:t>
+            </a:r>
+            <a:endParaRPr lang="en-US" sz="1400" dirty="0">
+              <a:latin typeface="Calisto MT" panose="02040603050505030304" pitchFamily="18" charset="0"/>
+            </a:endParaRPr>
+          </a:p>
+        </p:txBody>
+      </p:sp>
+      <p:sp>
+        <p:nvSpPr>
+          <p:cNvPr id="10" name="Rectangle 9"/>
+          <p:cNvSpPr/>
+          <p:nvPr/>
+        </p:nvSpPr>
+        <p:spPr>
+          <a:xfrm>
+            <a:off x="5609661" y="4244988"/>
+            <a:ext cx="1097280" cy="365760"/>
+          </a:xfrm>
+          <a:prstGeom prst="rect">
+            <a:avLst/>
+          </a:prstGeom>
+          <a:solidFill>
+            <a:schemeClr val="accent5">
+              <a:lumMod val="75000"/>
+            </a:schemeClr>
+          </a:solidFill>
+          <a:ln w="19050"/>
+        </p:spPr>
+        <p:style>
+          <a:lnRef idx="3">
+            <a:schemeClr val="lt1"/>
+          </a:lnRef>
+          <a:fillRef idx="1">
+            <a:schemeClr val="accent6"/>
+          </a:fillRef>
+          <a:effectRef idx="1">
+            <a:schemeClr val="accent6"/>
+          </a:effectRef>
+          <a:fontRef idx="minor">
+            <a:schemeClr val="lt1"/>
+          </a:fontRef>
+        </p:style>
+        <p:txBody>
+          <a:bodyPr rtlCol="0" anchor="ctr"/>
+          <a:lstStyle/>
+          <a:p>
+            <a:pPr algn="ctr"/>
+            <a:r>
+              <a:rPr lang="fr-CA" sz="1400" dirty="0">
+                <a:latin typeface="Calisto MT" panose="02040603050505030304" pitchFamily="18" charset="0"/>
+              </a:rPr>
+              <a:t>googletest</a:t>
+            </a:r>
+            <a:endParaRPr lang="en-US" sz="1400" dirty="0">
+              <a:latin typeface="Calisto MT" panose="02040603050505030304" pitchFamily="18" charset="0"/>
+            </a:endParaRPr>
+          </a:p>
+        </p:txBody>
+      </p:sp>
+      <p:sp>
+        <p:nvSpPr>
+          <p:cNvPr id="11" name="Rectangle 10"/>
+          <p:cNvSpPr/>
+          <p:nvPr/>
+        </p:nvSpPr>
+        <p:spPr>
+          <a:xfrm>
+            <a:off x="5609661" y="670098"/>
+            <a:ext cx="1097280" cy="365760"/>
+          </a:xfrm>
+          <a:prstGeom prst="rect">
+            <a:avLst/>
+          </a:prstGeom>
+          <a:solidFill>
+            <a:schemeClr val="accent4">
+              <a:lumMod val="75000"/>
+            </a:schemeClr>
+          </a:solidFill>
+          <a:ln w="50800" cap="sq" cmpd="dbl">
+            <a:solidFill>
+              <a:schemeClr val="accent1">
+                <a:shade val="50000"/>
+              </a:schemeClr>
+            </a:solidFill>
+            <a:prstDash val="solid"/>
+          </a:ln>
+        </p:spPr>
+        <p:style>
+          <a:lnRef idx="2">
+            <a:schemeClr val="accent1">
+              <a:shade val="50000"/>
+            </a:schemeClr>
+          </a:lnRef>
+          <a:fillRef idx="1">
+            <a:schemeClr val="accent1"/>
+          </a:fillRef>
+          <a:effectRef idx="0">
+            <a:schemeClr val="accent1"/>
+          </a:effectRef>
+          <a:fontRef idx="minor">
+            <a:schemeClr val="lt1"/>
+          </a:fontRef>
+        </p:style>
+        <p:txBody>
+          <a:bodyPr rot="0" spcFirstLastPara="0" vertOverflow="overflow" horzOverflow="overflow" vert="horz" wrap="square" lIns="91440" tIns="45720" rIns="91440" bIns="45720" numCol="1" spcCol="0" rtlCol="0" fromWordArt="0" anchor="ctr" anchorCtr="0" forceAA="0" compatLnSpc="1">
+            <a:prstTxWarp prst="textNoShape">
+              <a:avLst/>
+            </a:prstTxWarp>
+            <a:noAutofit/>
+          </a:bodyPr>
+          <a:lstStyle/>
+          <a:p>
+            <a:pPr algn="ctr"/>
+            <a:r>
+              <a:rPr lang="fr-CA" sz="1400" dirty="0">
+                <a:latin typeface="Calisto MT" panose="02040603050505030304" pitchFamily="18" charset="0"/>
+              </a:rPr>
+              <a:t>UnitTests</a:t>
+            </a:r>
+            <a:endParaRPr lang="en-US" sz="1400" dirty="0">
+              <a:latin typeface="Calisto MT" panose="02040603050505030304" pitchFamily="18" charset="0"/>
+            </a:endParaRPr>
+          </a:p>
+        </p:txBody>
+      </p:sp>
+      <p:cxnSp>
+        <p:nvCxnSpPr>
+          <p:cNvPr id="13" name="Connector: Elbow 12"/>
+          <p:cNvCxnSpPr>
+            <a:cxnSpLocks/>
+            <a:stCxn id="7" idx="2"/>
+            <a:endCxn id="8" idx="0"/>
+          </p:cNvCxnSpPr>
+          <p:nvPr/>
+        </p:nvCxnSpPr>
+        <p:spPr>
+          <a:xfrm rot="16200000" flipH="1">
+            <a:off x="3467514" y="2857539"/>
+            <a:ext cx="217989" cy="28"/>
+          </a:xfrm>
+          <a:prstGeom prst="bentConnector3">
+            <a:avLst/>
+          </a:prstGeom>
+          <a:ln w="19050">
+            <a:solidFill>
+              <a:schemeClr val="tx1"/>
+            </a:solidFill>
+            <a:tailEnd type="triangle"/>
+          </a:ln>
+        </p:spPr>
+        <p:style>
+          <a:lnRef idx="1">
+            <a:schemeClr val="accent1"/>
+          </a:lnRef>
+          <a:fillRef idx="0">
+            <a:schemeClr val="accent1"/>
+          </a:fillRef>
+          <a:effectRef idx="0">
+            <a:schemeClr val="accent1"/>
+          </a:effectRef>
+          <a:fontRef idx="minor">
+            <a:schemeClr val="tx1"/>
+          </a:fontRef>
+        </p:style>
+      </p:cxnSp>
+      <p:cxnSp>
+        <p:nvCxnSpPr>
+          <p:cNvPr id="15" name="Connector: Elbow 14"/>
+          <p:cNvCxnSpPr>
+            <a:cxnSpLocks/>
+            <a:stCxn id="11" idx="2"/>
+            <a:endCxn id="6" idx="3"/>
+          </p:cNvCxnSpPr>
+          <p:nvPr/>
+        </p:nvCxnSpPr>
+        <p:spPr>
+          <a:xfrm rot="5400000">
+            <a:off x="5589340" y="860761"/>
+            <a:ext cx="393864" cy="744059"/>
+          </a:xfrm>
+          <a:prstGeom prst="bentConnector2">
+            <a:avLst/>
+          </a:prstGeom>
+          <a:ln w="19050">
+            <a:solidFill>
+              <a:schemeClr val="tx1"/>
+            </a:solidFill>
+            <a:tailEnd type="triangle"/>
+          </a:ln>
+        </p:spPr>
+        <p:style>
+          <a:lnRef idx="1">
+            <a:schemeClr val="accent1"/>
+          </a:lnRef>
+          <a:fillRef idx="0">
+            <a:schemeClr val="accent1"/>
+          </a:fillRef>
+          <a:effectRef idx="0">
+            <a:schemeClr val="accent1"/>
+          </a:effectRef>
+          <a:fontRef idx="minor">
+            <a:schemeClr val="tx1"/>
+          </a:fontRef>
+        </p:style>
+      </p:cxnSp>
+      <p:cxnSp>
+        <p:nvCxnSpPr>
+          <p:cNvPr id="18" name="Straight Arrow Connector 17"/>
+          <p:cNvCxnSpPr>
+            <a:stCxn id="11" idx="2"/>
+            <a:endCxn id="10" idx="0"/>
+          </p:cNvCxnSpPr>
+          <p:nvPr/>
+        </p:nvCxnSpPr>
+        <p:spPr>
+          <a:xfrm>
+            <a:off x="6158301" y="1035858"/>
+            <a:ext cx="0" cy="3209130"/>
+          </a:xfrm>
+          <a:prstGeom prst="straightConnector1">
+            <a:avLst/>
+          </a:prstGeom>
+          <a:ln w="19050">
+            <a:solidFill>
+              <a:schemeClr val="tx1"/>
+            </a:solidFill>
+            <a:tailEnd type="triangle"/>
+          </a:ln>
+        </p:spPr>
+        <p:style>
+          <a:lnRef idx="1">
+            <a:schemeClr val="accent1"/>
+          </a:lnRef>
+          <a:fillRef idx="0">
+            <a:schemeClr val="accent1"/>
+          </a:fillRef>
+          <a:effectRef idx="0">
+            <a:schemeClr val="accent1"/>
+          </a:effectRef>
+          <a:fontRef idx="minor">
+            <a:schemeClr val="tx1"/>
+          </a:fontRef>
+        </p:style>
+      </p:cxnSp>
+      <p:sp>
+        <p:nvSpPr>
+          <p:cNvPr id="19" name="Rectangle 18"/>
+          <p:cNvSpPr/>
+          <p:nvPr/>
+        </p:nvSpPr>
+        <p:spPr>
+          <a:xfrm>
+            <a:off x="2774950" y="457200"/>
+            <a:ext cx="4146550" cy="4352989"/>
+          </a:xfrm>
+          <a:prstGeom prst="rect">
+            <a:avLst/>
+          </a:prstGeom>
+          <a:noFill/>
+        </p:spPr>
+        <p:style>
+          <a:lnRef idx="2">
+            <a:schemeClr val="accent1">
+              <a:shade val="50000"/>
+            </a:schemeClr>
+          </a:lnRef>
+          <a:fillRef idx="1">
+            <a:schemeClr val="accent1"/>
+          </a:fillRef>
+          <a:effectRef idx="0">
+            <a:schemeClr val="accent1"/>
+          </a:effectRef>
+          <a:fontRef idx="minor">
+            <a:schemeClr val="lt1"/>
+          </a:fontRef>
+        </p:style>
+        <p:txBody>
+          <a:bodyPr rtlCol="0" anchor="ctr"/>
+          <a:lstStyle/>
+          <a:p>
+            <a:pPr algn="ctr"/>
+            <a:endParaRPr lang="en-US" sz="1600">
+              <a:latin typeface="Calisto MT" panose="02040603050505030304" pitchFamily="18" charset="0"/>
+            </a:endParaRPr>
+          </a:p>
+        </p:txBody>
+      </p:sp>
+      <p:cxnSp>
+        <p:nvCxnSpPr>
+          <p:cNvPr id="20" name="Straight Connector 19"/>
+          <p:cNvCxnSpPr>
+            <a:cxnSpLocks/>
+          </p:cNvCxnSpPr>
+          <p:nvPr/>
+        </p:nvCxnSpPr>
+        <p:spPr>
+          <a:xfrm>
+            <a:off x="2774950" y="4043560"/>
+            <a:ext cx="4146550" cy="1"/>
+          </a:xfrm>
+          <a:prstGeom prst="line">
+            <a:avLst/>
+          </a:prstGeom>
+          <a:ln w="12700">
+            <a:solidFill>
+              <a:schemeClr val="tx1"/>
+            </a:solidFill>
+            <a:prstDash val="lgDash"/>
+          </a:ln>
+        </p:spPr>
+        <p:style>
+          <a:lnRef idx="1">
+            <a:schemeClr val="accent1"/>
+          </a:lnRef>
+          <a:fillRef idx="0">
+            <a:schemeClr val="accent1"/>
+          </a:fillRef>
+          <a:effectRef idx="0">
+            <a:schemeClr val="accent1"/>
+          </a:effectRef>
+          <a:fontRef idx="minor">
+            <a:schemeClr val="tx1"/>
+          </a:fontRef>
+        </p:style>
+      </p:cxnSp>
+      <p:sp>
+        <p:nvSpPr>
+          <p:cNvPr id="24" name="Rectangle 23"/>
+          <p:cNvSpPr/>
+          <p:nvPr/>
+        </p:nvSpPr>
+        <p:spPr>
+          <a:xfrm>
+            <a:off x="4316962" y="1812253"/>
+            <a:ext cx="1097280" cy="365760"/>
+          </a:xfrm>
+          <a:prstGeom prst="rect">
+            <a:avLst/>
+          </a:prstGeom>
+          <a:solidFill>
+            <a:schemeClr val="accent4">
+              <a:lumMod val="75000"/>
+            </a:schemeClr>
+          </a:solidFill>
+          <a:ln w="19050"/>
+        </p:spPr>
+        <p:style>
+          <a:lnRef idx="2">
+            <a:schemeClr val="accent1">
+              <a:shade val="50000"/>
+            </a:schemeClr>
+          </a:lnRef>
+          <a:fillRef idx="1">
+            <a:schemeClr val="accent1"/>
+          </a:fillRef>
+          <a:effectRef idx="0">
+            <a:schemeClr val="accent1"/>
+          </a:effectRef>
+          <a:fontRef idx="minor">
+            <a:schemeClr val="lt1"/>
+          </a:fontRef>
+        </p:style>
+        <p:txBody>
+          <a:bodyPr rtlCol="0" anchor="ctr"/>
+          <a:lstStyle/>
+          <a:p>
+            <a:pPr algn="ctr"/>
+            <a:r>
+              <a:rPr lang="fr-CA" sz="1400" dirty="0">
+                <a:latin typeface="Calisto MT" panose="02040603050505030304" pitchFamily="18" charset="0"/>
+              </a:rPr>
+              <a:t>Midi</a:t>
+            </a:r>
+            <a:endParaRPr lang="en-US" sz="1400" dirty="0">
+              <a:latin typeface="Calisto MT" panose="02040603050505030304" pitchFamily="18" charset="0"/>
+            </a:endParaRPr>
+          </a:p>
+        </p:txBody>
+      </p:sp>
+      <p:sp>
+        <p:nvSpPr>
+          <p:cNvPr id="30" name="Rectangle 29"/>
+          <p:cNvSpPr/>
+          <p:nvPr/>
+        </p:nvSpPr>
+        <p:spPr>
+          <a:xfrm>
+            <a:off x="4316962" y="2966548"/>
+            <a:ext cx="1097280" cy="365760"/>
+          </a:xfrm>
+          <a:prstGeom prst="rect">
+            <a:avLst/>
+          </a:prstGeom>
+          <a:solidFill>
+            <a:schemeClr val="accent4">
+              <a:lumMod val="75000"/>
+            </a:schemeClr>
+          </a:solidFill>
+          <a:ln w="19050"/>
+        </p:spPr>
+        <p:style>
+          <a:lnRef idx="2">
+            <a:schemeClr val="accent1">
+              <a:shade val="50000"/>
+            </a:schemeClr>
+          </a:lnRef>
+          <a:fillRef idx="1">
+            <a:schemeClr val="accent1"/>
+          </a:fillRef>
+          <a:effectRef idx="0">
+            <a:schemeClr val="accent1"/>
+          </a:effectRef>
+          <a:fontRef idx="minor">
+            <a:schemeClr val="lt1"/>
+          </a:fontRef>
+        </p:style>
+        <p:txBody>
+          <a:bodyPr rtlCol="0" anchor="ctr"/>
+          <a:lstStyle/>
+          <a:p>
+            <a:pPr algn="ctr"/>
+            <a:r>
+              <a:rPr lang="fr-CA" sz="1400" dirty="0">
+                <a:latin typeface="Calisto MT" panose="02040603050505030304" pitchFamily="18" charset="0"/>
+              </a:rPr>
+              <a:t>JUCEUtils</a:t>
+            </a:r>
+            <a:endParaRPr lang="en-US" sz="1400" dirty="0">
+              <a:latin typeface="Calisto MT" panose="02040603050505030304" pitchFamily="18" charset="0"/>
+            </a:endParaRPr>
+          </a:p>
+        </p:txBody>
+      </p:sp>
+      <p:cxnSp>
+        <p:nvCxnSpPr>
+          <p:cNvPr id="32" name="Straight Arrow Connector 31"/>
+          <p:cNvCxnSpPr>
+            <a:stCxn id="24" idx="2"/>
+            <a:endCxn id="30" idx="0"/>
+          </p:cNvCxnSpPr>
+          <p:nvPr/>
+        </p:nvCxnSpPr>
+        <p:spPr>
+          <a:xfrm>
+            <a:off x="4865602" y="2178013"/>
+            <a:ext cx="0" cy="788535"/>
+          </a:xfrm>
+          <a:prstGeom prst="straightConnector1">
+            <a:avLst/>
+          </a:prstGeom>
+          <a:ln w="19050">
+            <a:solidFill>
+              <a:schemeClr val="tx1"/>
+            </a:solidFill>
+            <a:tailEnd type="triangle"/>
+          </a:ln>
+        </p:spPr>
+        <p:style>
+          <a:lnRef idx="1">
+            <a:schemeClr val="accent1"/>
+          </a:lnRef>
+          <a:fillRef idx="0">
+            <a:schemeClr val="accent1"/>
+          </a:fillRef>
+          <a:effectRef idx="0">
+            <a:schemeClr val="accent1"/>
+          </a:effectRef>
+          <a:fontRef idx="minor">
+            <a:schemeClr val="tx1"/>
+          </a:fontRef>
+        </p:style>
+      </p:cxnSp>
+      <p:cxnSp>
+        <p:nvCxnSpPr>
+          <p:cNvPr id="36" name="Connector: Elbow 35"/>
+          <p:cNvCxnSpPr>
+            <a:cxnSpLocks/>
+            <a:stCxn id="24" idx="2"/>
+            <a:endCxn id="7" idx="3"/>
+          </p:cNvCxnSpPr>
+          <p:nvPr/>
+        </p:nvCxnSpPr>
+        <p:spPr>
+          <a:xfrm rot="5400000">
+            <a:off x="4301535" y="2001612"/>
+            <a:ext cx="387666" cy="740468"/>
+          </a:xfrm>
+          <a:prstGeom prst="bentConnector2">
+            <a:avLst/>
+          </a:prstGeom>
+          <a:ln w="19050">
+            <a:solidFill>
+              <a:schemeClr val="tx1"/>
+            </a:solidFill>
+            <a:tailEnd type="triangle"/>
+          </a:ln>
+        </p:spPr>
+        <p:style>
+          <a:lnRef idx="1">
+            <a:schemeClr val="accent1"/>
+          </a:lnRef>
+          <a:fillRef idx="0">
+            <a:schemeClr val="accent1"/>
+          </a:fillRef>
+          <a:effectRef idx="0">
+            <a:schemeClr val="accent1"/>
+          </a:effectRef>
+          <a:fontRef idx="minor">
+            <a:schemeClr val="tx1"/>
+          </a:fontRef>
+        </p:style>
+      </p:cxnSp>
+      <p:sp>
+        <p:nvSpPr>
+          <p:cNvPr id="33" name="Rectangle 32"/>
+          <p:cNvSpPr/>
+          <p:nvPr/>
+        </p:nvSpPr>
+        <p:spPr>
+          <a:xfrm>
+            <a:off x="4316962" y="676296"/>
+            <a:ext cx="1097280" cy="365760"/>
+          </a:xfrm>
+          <a:prstGeom prst="rect">
+            <a:avLst/>
+          </a:prstGeom>
+          <a:solidFill>
+            <a:schemeClr val="accent4">
+              <a:lumMod val="75000"/>
+            </a:schemeClr>
+          </a:solidFill>
+          <a:ln w="50800" cap="sq" cmpd="dbl">
+            <a:solidFill>
+              <a:schemeClr val="accent1">
+                <a:shade val="50000"/>
+              </a:schemeClr>
+            </a:solidFill>
+            <a:prstDash val="solid"/>
+          </a:ln>
+        </p:spPr>
+        <p:style>
+          <a:lnRef idx="2">
+            <a:schemeClr val="accent1">
+              <a:shade val="50000"/>
+            </a:schemeClr>
+          </a:lnRef>
+          <a:fillRef idx="1">
+            <a:schemeClr val="accent1"/>
+          </a:fillRef>
+          <a:effectRef idx="0">
+            <a:schemeClr val="accent1"/>
+          </a:effectRef>
+          <a:fontRef idx="minor">
+            <a:schemeClr val="lt1"/>
+          </a:fontRef>
+        </p:style>
+        <p:txBody>
+          <a:bodyPr rot="0" spcFirstLastPara="0" vertOverflow="overflow" horzOverflow="overflow" vert="horz" wrap="square" lIns="91440" tIns="45720" rIns="91440" bIns="45720" numCol="1" spcCol="0" rtlCol="0" fromWordArt="0" anchor="ctr" anchorCtr="0" forceAA="0" compatLnSpc="1">
+            <a:prstTxWarp prst="textNoShape">
+              <a:avLst/>
+            </a:prstTxWarp>
+            <a:noAutofit/>
+          </a:bodyPr>
+          <a:lstStyle/>
+          <a:p>
+            <a:pPr algn="ctr"/>
+            <a:r>
+              <a:rPr lang="fr-CA" sz="1400" dirty="0">
+                <a:latin typeface="Calisto MT" panose="02040603050505030304" pitchFamily="18" charset="0"/>
+              </a:rPr>
+              <a:t>GUI</a:t>
+            </a:r>
+            <a:endParaRPr lang="en-US" sz="1400" dirty="0">
+              <a:latin typeface="Calisto MT" panose="02040603050505030304" pitchFamily="18" charset="0"/>
+            </a:endParaRPr>
+          </a:p>
+        </p:txBody>
+      </p:sp>
+      <p:cxnSp>
+        <p:nvCxnSpPr>
+          <p:cNvPr id="46" name="Straight Arrow Connector 45"/>
+          <p:cNvCxnSpPr>
+            <a:stCxn id="33" idx="2"/>
+            <a:endCxn id="6" idx="0"/>
+          </p:cNvCxnSpPr>
+          <p:nvPr/>
+        </p:nvCxnSpPr>
+        <p:spPr>
+          <a:xfrm>
+            <a:off x="4865602" y="1042056"/>
+            <a:ext cx="0" cy="204786"/>
+          </a:xfrm>
+          <a:prstGeom prst="straightConnector1">
+            <a:avLst/>
+          </a:prstGeom>
+          <a:ln w="19050">
+            <a:solidFill>
+              <a:schemeClr val="tx1"/>
+            </a:solidFill>
+            <a:tailEnd type="triangle"/>
+          </a:ln>
+        </p:spPr>
+        <p:style>
+          <a:lnRef idx="1">
+            <a:schemeClr val="accent1"/>
+          </a:lnRef>
+          <a:fillRef idx="0">
+            <a:schemeClr val="accent1"/>
+          </a:fillRef>
+          <a:effectRef idx="0">
+            <a:schemeClr val="accent1"/>
+          </a:effectRef>
+          <a:fontRef idx="minor">
+            <a:schemeClr val="tx1"/>
+          </a:fontRef>
+        </p:style>
+      </p:cxnSp>
+      <p:cxnSp>
+        <p:nvCxnSpPr>
+          <p:cNvPr id="47" name="Straight Arrow Connector 46"/>
+          <p:cNvCxnSpPr>
+            <a:cxnSpLocks/>
+            <a:stCxn id="6" idx="2"/>
+            <a:endCxn id="24" idx="0"/>
+          </p:cNvCxnSpPr>
+          <p:nvPr/>
+        </p:nvCxnSpPr>
+        <p:spPr>
+          <a:xfrm>
+            <a:off x="4865602" y="1612602"/>
+            <a:ext cx="0" cy="199651"/>
+          </a:xfrm>
+          <a:prstGeom prst="straightConnector1">
+            <a:avLst/>
+          </a:prstGeom>
+          <a:ln w="19050">
+            <a:solidFill>
+              <a:schemeClr val="tx1"/>
+            </a:solidFill>
+            <a:tailEnd type="triangle"/>
+          </a:ln>
+        </p:spPr>
+        <p:style>
+          <a:lnRef idx="1">
+            <a:schemeClr val="accent1"/>
+          </a:lnRef>
+          <a:fillRef idx="0">
+            <a:schemeClr val="accent1"/>
+          </a:fillRef>
+          <a:effectRef idx="0">
+            <a:schemeClr val="accent1"/>
+          </a:effectRef>
+          <a:fontRef idx="minor">
+            <a:schemeClr val="tx1"/>
+          </a:fontRef>
+        </p:style>
+      </p:cxnSp>
+      <p:sp>
+        <p:nvSpPr>
+          <p:cNvPr id="50" name="Rectangle 49"/>
+          <p:cNvSpPr/>
+          <p:nvPr/>
+        </p:nvSpPr>
+        <p:spPr>
+          <a:xfrm>
+            <a:off x="3027854" y="1816605"/>
+            <a:ext cx="1097280" cy="365760"/>
+          </a:xfrm>
+          <a:prstGeom prst="rect">
+            <a:avLst/>
+          </a:prstGeom>
+          <a:solidFill>
+            <a:schemeClr val="accent4">
+              <a:lumMod val="75000"/>
+            </a:schemeClr>
+          </a:solidFill>
+          <a:ln w="19050"/>
+        </p:spPr>
+        <p:style>
+          <a:lnRef idx="2">
+            <a:schemeClr val="accent1">
+              <a:shade val="50000"/>
+            </a:schemeClr>
+          </a:lnRef>
+          <a:fillRef idx="1">
+            <a:schemeClr val="accent1"/>
+          </a:fillRef>
+          <a:effectRef idx="0">
+            <a:schemeClr val="accent1"/>
+          </a:effectRef>
+          <a:fontRef idx="minor">
+            <a:schemeClr val="lt1"/>
+          </a:fontRef>
+        </p:style>
+        <p:txBody>
+          <a:bodyPr rtlCol="0" anchor="ctr"/>
+          <a:lstStyle/>
+          <a:p>
+            <a:pPr algn="ctr"/>
+            <a:r>
+              <a:rPr lang="fr-CA" sz="1400" dirty="0">
+                <a:latin typeface="Calisto MT" panose="02040603050505030304" pitchFamily="18" charset="0"/>
+              </a:rPr>
+              <a:t>PluginAPI</a:t>
+            </a:r>
+            <a:endParaRPr lang="en-US" sz="1400" dirty="0">
+              <a:latin typeface="Calisto MT" panose="02040603050505030304" pitchFamily="18" charset="0"/>
+            </a:endParaRPr>
+          </a:p>
+        </p:txBody>
+      </p:sp>
+      <p:cxnSp>
+        <p:nvCxnSpPr>
+          <p:cNvPr id="56" name="Connector: Elbow 55"/>
+          <p:cNvCxnSpPr>
+            <a:stCxn id="6" idx="1"/>
+            <a:endCxn id="50" idx="0"/>
+          </p:cNvCxnSpPr>
+          <p:nvPr/>
+        </p:nvCxnSpPr>
+        <p:spPr>
+          <a:xfrm rot="10800000" flipV="1">
+            <a:off x="3576494" y="1429721"/>
+            <a:ext cx="740468" cy="386883"/>
+          </a:xfrm>
+          <a:prstGeom prst="bentConnector2">
+            <a:avLst/>
+          </a:prstGeom>
+          <a:ln w="19050">
+            <a:solidFill>
+              <a:schemeClr val="tx1"/>
+            </a:solidFill>
+            <a:tailEnd type="triangle"/>
+          </a:ln>
+        </p:spPr>
+        <p:style>
+          <a:lnRef idx="1">
+            <a:schemeClr val="accent1"/>
+          </a:lnRef>
+          <a:fillRef idx="0">
+            <a:schemeClr val="accent1"/>
+          </a:fillRef>
+          <a:effectRef idx="0">
+            <a:schemeClr val="accent1"/>
+          </a:effectRef>
+          <a:fontRef idx="minor">
+            <a:schemeClr val="tx1"/>
+          </a:fontRef>
+        </p:style>
+      </p:cxnSp>
+      <p:cxnSp>
+        <p:nvCxnSpPr>
+          <p:cNvPr id="58" name="Straight Arrow Connector 57"/>
+          <p:cNvCxnSpPr>
+            <a:cxnSpLocks/>
+            <a:stCxn id="50" idx="2"/>
+            <a:endCxn id="7" idx="0"/>
+          </p:cNvCxnSpPr>
+          <p:nvPr/>
+        </p:nvCxnSpPr>
+        <p:spPr>
+          <a:xfrm>
+            <a:off x="3576494" y="2182365"/>
+            <a:ext cx="0" cy="200434"/>
+          </a:xfrm>
+          <a:prstGeom prst="straightConnector1">
+            <a:avLst/>
+          </a:prstGeom>
+          <a:ln w="19050">
+            <a:solidFill>
+              <a:schemeClr val="tx1"/>
+            </a:solidFill>
+            <a:tailEnd type="triangle"/>
+          </a:ln>
+        </p:spPr>
+        <p:style>
+          <a:lnRef idx="1">
+            <a:schemeClr val="accent1"/>
+          </a:lnRef>
+          <a:fillRef idx="0">
+            <a:schemeClr val="accent1"/>
+          </a:fillRef>
+          <a:effectRef idx="0">
+            <a:schemeClr val="accent1"/>
+          </a:effectRef>
+          <a:fontRef idx="minor">
+            <a:schemeClr val="tx1"/>
+          </a:fontRef>
+        </p:style>
+      </p:cxnSp>
+      <p:sp>
+        <p:nvSpPr>
+          <p:cNvPr id="73" name="TextBox 72"/>
+          <p:cNvSpPr txBox="1"/>
+          <p:nvPr/>
+        </p:nvSpPr>
+        <p:spPr>
+          <a:xfrm>
+            <a:off x="2729237" y="429171"/>
+            <a:ext cx="1225899" cy="261610"/>
+          </a:xfrm>
+          <a:prstGeom prst="rect">
+            <a:avLst/>
+          </a:prstGeom>
+          <a:noFill/>
+        </p:spPr>
+        <p:txBody>
+          <a:bodyPr wrap="square" rtlCol="0">
+            <a:spAutoFit/>
+          </a:bodyPr>
+          <a:lstStyle/>
+          <a:p>
+            <a:r>
+              <a:rPr lang="fr-CA" sz="1050" dirty="0">
+                <a:latin typeface="Calisto MT" panose="02040603050505030304" pitchFamily="18" charset="0"/>
+              </a:rPr>
+              <a:t>Stretto</a:t>
+            </a:r>
+            <a:endParaRPr lang="en-US" sz="1050" dirty="0">
+              <a:latin typeface="Calisto MT" panose="02040603050505030304" pitchFamily="18" charset="0"/>
+            </a:endParaRPr>
+          </a:p>
+        </p:txBody>
+      </p:sp>
+      <p:sp>
+        <p:nvSpPr>
+          <p:cNvPr id="74" name="TextBox 73"/>
+          <p:cNvSpPr txBox="1"/>
+          <p:nvPr/>
+        </p:nvSpPr>
+        <p:spPr>
+          <a:xfrm>
+            <a:off x="2729237" y="4012974"/>
+            <a:ext cx="1225899" cy="261610"/>
+          </a:xfrm>
+          <a:prstGeom prst="rect">
+            <a:avLst/>
+          </a:prstGeom>
+          <a:noFill/>
+        </p:spPr>
+        <p:txBody>
+          <a:bodyPr wrap="square" rtlCol="0">
+            <a:spAutoFit/>
+          </a:bodyPr>
+          <a:lstStyle/>
+          <a:p>
+            <a:r>
+              <a:rPr lang="fr-CA" sz="1050" dirty="0">
+                <a:latin typeface="Calisto MT" panose="02040603050505030304" pitchFamily="18" charset="0"/>
+              </a:rPr>
+              <a:t>Third-Party</a:t>
+            </a:r>
+            <a:endParaRPr lang="en-US" sz="1050" dirty="0">
+              <a:latin typeface="Calisto MT" panose="02040603050505030304" pitchFamily="18" charset="0"/>
+            </a:endParaRPr>
+          </a:p>
+        </p:txBody>
+      </p:sp>
+      <p:cxnSp>
+        <p:nvCxnSpPr>
+          <p:cNvPr id="78" name="Straight Arrow Connector 77"/>
+          <p:cNvCxnSpPr>
+            <a:stCxn id="30" idx="2"/>
+            <a:endCxn id="9" idx="0"/>
+          </p:cNvCxnSpPr>
+          <p:nvPr/>
+        </p:nvCxnSpPr>
+        <p:spPr>
+          <a:xfrm>
+            <a:off x="4865602" y="3332308"/>
+            <a:ext cx="3590" cy="912680"/>
+          </a:xfrm>
+          <a:prstGeom prst="straightConnector1">
+            <a:avLst/>
+          </a:prstGeom>
+          <a:ln w="19050">
+            <a:solidFill>
+              <a:schemeClr val="tx1"/>
+            </a:solidFill>
+            <a:tailEnd type="triangle"/>
+          </a:ln>
+        </p:spPr>
+        <p:style>
+          <a:lnRef idx="1">
+            <a:schemeClr val="accent1"/>
+          </a:lnRef>
+          <a:fillRef idx="0">
+            <a:schemeClr val="accent1"/>
+          </a:fillRef>
+          <a:effectRef idx="0">
+            <a:schemeClr val="accent1"/>
+          </a:effectRef>
+          <a:fontRef idx="minor">
+            <a:schemeClr val="tx1"/>
+          </a:fontRef>
+        </p:style>
+      </p:cxnSp>
+      <p:cxnSp>
+        <p:nvCxnSpPr>
+          <p:cNvPr id="80" name="Straight Connector 79"/>
+          <p:cNvCxnSpPr>
+            <a:cxnSpLocks/>
+          </p:cNvCxnSpPr>
+          <p:nvPr/>
+        </p:nvCxnSpPr>
+        <p:spPr>
+          <a:xfrm>
+            <a:off x="2792327" y="3381920"/>
+            <a:ext cx="4146550" cy="1"/>
+          </a:xfrm>
+          <a:prstGeom prst="line">
+            <a:avLst/>
+          </a:prstGeom>
+          <a:ln w="12700">
+            <a:solidFill>
+              <a:schemeClr val="tx1"/>
+            </a:solidFill>
+            <a:prstDash val="lgDash"/>
+          </a:ln>
+        </p:spPr>
+        <p:style>
+          <a:lnRef idx="1">
+            <a:schemeClr val="accent1"/>
+          </a:lnRef>
+          <a:fillRef idx="0">
+            <a:schemeClr val="accent1"/>
+          </a:fillRef>
+          <a:effectRef idx="0">
+            <a:schemeClr val="accent1"/>
+          </a:effectRef>
+          <a:fontRef idx="minor">
+            <a:schemeClr val="tx1"/>
+          </a:fontRef>
+        </p:style>
+      </p:cxnSp>
+      <p:sp>
+        <p:nvSpPr>
+          <p:cNvPr id="82" name="TextBox 81"/>
+          <p:cNvSpPr txBox="1"/>
+          <p:nvPr/>
+        </p:nvSpPr>
+        <p:spPr>
+          <a:xfrm>
+            <a:off x="2720830" y="3332502"/>
+            <a:ext cx="568176" cy="253447"/>
+          </a:xfrm>
+          <a:prstGeom prst="rect">
+            <a:avLst/>
+          </a:prstGeom>
+          <a:noFill/>
+        </p:spPr>
+        <p:txBody>
+          <a:bodyPr wrap="square" rtlCol="0">
+            <a:spAutoFit/>
+          </a:bodyPr>
+          <a:lstStyle/>
+          <a:p>
+            <a:r>
+              <a:rPr lang="fr-CA" sz="1050" dirty="0">
+                <a:latin typeface="Calisto MT" panose="02040603050505030304" pitchFamily="18" charset="0"/>
+              </a:rPr>
+              <a:t>FXG</a:t>
+            </a:r>
+            <a:endParaRPr lang="en-US" sz="1050" dirty="0">
+              <a:latin typeface="Calisto MT" panose="02040603050505030304" pitchFamily="18" charset="0"/>
+            </a:endParaRPr>
+          </a:p>
+        </p:txBody>
+      </p:sp>
+      <p:sp>
+        <p:nvSpPr>
+          <p:cNvPr id="83" name="Rectangle 82"/>
+          <p:cNvSpPr/>
+          <p:nvPr/>
+        </p:nvSpPr>
+        <p:spPr>
+          <a:xfrm>
+            <a:off x="7056854" y="4033502"/>
+            <a:ext cx="680444" cy="277899"/>
+          </a:xfrm>
+          <a:prstGeom prst="rect">
+            <a:avLst/>
+          </a:prstGeom>
+          <a:solidFill>
+            <a:schemeClr val="bg1">
+              <a:lumMod val="85000"/>
+            </a:schemeClr>
+          </a:solidFill>
+          <a:ln w="19050">
+            <a:prstDash val="solid"/>
+          </a:ln>
+        </p:spPr>
+        <p:style>
+          <a:lnRef idx="2">
+            <a:schemeClr val="accent1">
+              <a:shade val="50000"/>
+            </a:schemeClr>
+          </a:lnRef>
+          <a:fillRef idx="1">
+            <a:schemeClr val="accent1"/>
+          </a:fillRef>
+          <a:effectRef idx="0">
+            <a:schemeClr val="accent1"/>
+          </a:effectRef>
+          <a:fontRef idx="minor">
+            <a:schemeClr val="lt1"/>
+          </a:fontRef>
+        </p:style>
+        <p:txBody>
+          <a:bodyPr rot="0" spcFirstLastPara="0" vertOverflow="overflow" horzOverflow="overflow" vert="horz" wrap="square" lIns="91440" tIns="45720" rIns="91440" bIns="45720" numCol="1" spcCol="0" rtlCol="0" fromWordArt="0" anchor="ctr" anchorCtr="0" forceAA="0" compatLnSpc="1">
+            <a:prstTxWarp prst="textNoShape">
+              <a:avLst/>
+            </a:prstTxWarp>
+            <a:noAutofit/>
+          </a:bodyPr>
+          <a:lstStyle/>
+          <a:p>
+            <a:pPr algn="ctr"/>
+            <a:r>
+              <a:rPr lang="fr-CA" sz="1400" dirty="0">
+                <a:solidFill>
+                  <a:schemeClr val="tx1"/>
+                </a:solidFill>
+                <a:latin typeface="Calisto MT" panose="02040603050505030304" pitchFamily="18" charset="0"/>
+              </a:rPr>
+              <a:t>.lib</a:t>
+            </a:r>
+            <a:endParaRPr lang="en-US" sz="1400" dirty="0">
+              <a:solidFill>
+                <a:schemeClr val="tx1"/>
+              </a:solidFill>
+              <a:latin typeface="Calisto MT" panose="02040603050505030304" pitchFamily="18" charset="0"/>
+            </a:endParaRPr>
+          </a:p>
+        </p:txBody>
+      </p:sp>
+      <p:sp>
+        <p:nvSpPr>
+          <p:cNvPr id="84" name="Rectangle 83"/>
+          <p:cNvSpPr/>
+          <p:nvPr/>
+        </p:nvSpPr>
+        <p:spPr>
+          <a:xfrm>
+            <a:off x="7056854" y="3636640"/>
+            <a:ext cx="680444" cy="277899"/>
+          </a:xfrm>
+          <a:prstGeom prst="rect">
+            <a:avLst/>
+          </a:prstGeom>
+          <a:solidFill>
+            <a:schemeClr val="bg1">
+              <a:lumMod val="85000"/>
+            </a:schemeClr>
+          </a:solidFill>
+          <a:ln w="50800" cap="sq" cmpd="dbl">
+            <a:solidFill>
+              <a:schemeClr val="accent1">
+                <a:shade val="50000"/>
+              </a:schemeClr>
+            </a:solidFill>
+            <a:prstDash val="solid"/>
+          </a:ln>
+        </p:spPr>
+        <p:style>
+          <a:lnRef idx="2">
+            <a:schemeClr val="accent1">
+              <a:shade val="50000"/>
+            </a:schemeClr>
+          </a:lnRef>
+          <a:fillRef idx="1">
+            <a:schemeClr val="accent1"/>
+          </a:fillRef>
+          <a:effectRef idx="0">
+            <a:schemeClr val="accent1"/>
+          </a:effectRef>
+          <a:fontRef idx="minor">
+            <a:schemeClr val="lt1"/>
+          </a:fontRef>
+        </p:style>
+        <p:txBody>
+          <a:bodyPr rot="0" spcFirstLastPara="0" vertOverflow="overflow" horzOverflow="overflow" vert="horz" wrap="square" lIns="91440" tIns="45720" rIns="91440" bIns="45720" numCol="1" spcCol="0" rtlCol="0" fromWordArt="0" anchor="ctr" anchorCtr="0" forceAA="0" compatLnSpc="1">
+            <a:prstTxWarp prst="textNoShape">
+              <a:avLst/>
+            </a:prstTxWarp>
+            <a:noAutofit/>
+          </a:bodyPr>
+          <a:lstStyle/>
+          <a:p>
+            <a:pPr algn="ctr"/>
+            <a:r>
+              <a:rPr lang="fr-CA" sz="1400" dirty="0">
+                <a:solidFill>
+                  <a:schemeClr val="tx1"/>
+                </a:solidFill>
+                <a:latin typeface="Calisto MT" panose="02040603050505030304" pitchFamily="18" charset="0"/>
+              </a:rPr>
+              <a:t>.exe</a:t>
+            </a:r>
+            <a:endParaRPr lang="en-US" sz="1400" dirty="0">
+              <a:solidFill>
+                <a:schemeClr val="tx1"/>
+              </a:solidFill>
+              <a:latin typeface="Calisto MT" panose="02040603050505030304" pitchFamily="18" charset="0"/>
+            </a:endParaRPr>
+          </a:p>
+        </p:txBody>
+      </p:sp>
+      <p:sp>
+        <p:nvSpPr>
+          <p:cNvPr id="85" name="Rectangle 84"/>
+          <p:cNvSpPr/>
+          <p:nvPr/>
+        </p:nvSpPr>
+        <p:spPr>
+          <a:xfrm>
+            <a:off x="7056854" y="4430364"/>
+            <a:ext cx="680444" cy="277899"/>
+          </a:xfrm>
+          <a:prstGeom prst="rect">
+            <a:avLst/>
+          </a:prstGeom>
+          <a:solidFill>
+            <a:schemeClr val="bg1">
+              <a:lumMod val="85000"/>
+            </a:schemeClr>
+          </a:solidFill>
+          <a:ln w="19050">
+            <a:prstDash val="dash"/>
+          </a:ln>
+        </p:spPr>
+        <p:style>
+          <a:lnRef idx="2">
+            <a:schemeClr val="accent1">
+              <a:shade val="50000"/>
+            </a:schemeClr>
+          </a:lnRef>
+          <a:fillRef idx="1">
+            <a:schemeClr val="accent1"/>
+          </a:fillRef>
+          <a:effectRef idx="0">
+            <a:schemeClr val="accent1"/>
+          </a:effectRef>
+          <a:fontRef idx="minor">
+            <a:schemeClr val="lt1"/>
+          </a:fontRef>
+        </p:style>
+        <p:txBody>
+          <a:bodyPr rot="0" spcFirstLastPara="0" vertOverflow="overflow" horzOverflow="overflow" vert="horz" wrap="square" lIns="91440" tIns="45720" rIns="91440" bIns="45720" numCol="1" spcCol="0" rtlCol="0" fromWordArt="0" anchor="ctr" anchorCtr="0" forceAA="0" compatLnSpc="1">
+            <a:prstTxWarp prst="textNoShape">
+              <a:avLst/>
+            </a:prstTxWarp>
+            <a:noAutofit/>
+          </a:bodyPr>
+          <a:lstStyle/>
+          <a:p>
+            <a:pPr algn="ctr"/>
+            <a:r>
+              <a:rPr lang="fr-CA" sz="1400" dirty="0">
+                <a:solidFill>
+                  <a:schemeClr val="tx1"/>
+                </a:solidFill>
+                <a:latin typeface="Calisto MT" panose="02040603050505030304" pitchFamily="18" charset="0"/>
+              </a:rPr>
+              <a:t>.dll</a:t>
+            </a:r>
+            <a:endParaRPr lang="en-US" sz="1400" dirty="0">
+              <a:solidFill>
+                <a:schemeClr val="tx1"/>
+              </a:solidFill>
+              <a:latin typeface="Calisto MT" panose="02040603050505030304" pitchFamily="18" charset="0"/>
+            </a:endParaRPr>
+          </a:p>
+        </p:txBody>
+      </p:sp>
+      <p:sp>
+        <p:nvSpPr>
+          <p:cNvPr id="37" name="Rectangle 36"/>
+          <p:cNvSpPr/>
+          <p:nvPr/>
+        </p:nvSpPr>
+        <p:spPr>
+          <a:xfrm>
+            <a:off x="3027854" y="678721"/>
+            <a:ext cx="1097280" cy="365760"/>
+          </a:xfrm>
+          <a:prstGeom prst="rect">
+            <a:avLst/>
+          </a:prstGeom>
+          <a:solidFill>
+            <a:schemeClr val="accent4">
+              <a:lumMod val="75000"/>
+            </a:schemeClr>
+          </a:solidFill>
+          <a:ln w="19050">
+            <a:prstDash val="dash"/>
+          </a:ln>
+        </p:spPr>
+        <p:style>
+          <a:lnRef idx="2">
+            <a:schemeClr val="accent1">
+              <a:shade val="50000"/>
+            </a:schemeClr>
+          </a:lnRef>
+          <a:fillRef idx="1">
+            <a:schemeClr val="accent1"/>
+          </a:fillRef>
+          <a:effectRef idx="0">
+            <a:schemeClr val="accent1"/>
+          </a:effectRef>
+          <a:fontRef idx="minor">
+            <a:schemeClr val="lt1"/>
+          </a:fontRef>
+        </p:style>
+        <p:txBody>
+          <a:bodyPr rtlCol="0" anchor="ctr"/>
+          <a:lstStyle/>
+          <a:p>
+            <a:pPr algn="ctr"/>
+            <a:r>
+              <a:rPr lang="fr-CA" sz="1200" dirty="0">
+                <a:latin typeface="Calisto MT" panose="02040603050505030304" pitchFamily="18" charset="0"/>
+              </a:rPr>
+              <a:t>BuiltinPlugin</a:t>
+            </a:r>
+            <a:endParaRPr lang="en-US" sz="1200" dirty="0">
+              <a:latin typeface="Calisto MT" panose="02040603050505030304" pitchFamily="18" charset="0"/>
+            </a:endParaRPr>
+          </a:p>
+        </p:txBody>
+      </p:sp>
+      <p:cxnSp>
+        <p:nvCxnSpPr>
+          <p:cNvPr id="38" name="Straight Arrow Connector 37"/>
+          <p:cNvCxnSpPr>
+            <a:cxnSpLocks/>
+            <a:stCxn id="37" idx="2"/>
+            <a:endCxn id="50" idx="0"/>
+          </p:cNvCxnSpPr>
+          <p:nvPr/>
+        </p:nvCxnSpPr>
+        <p:spPr>
+          <a:xfrm>
+            <a:off x="3576494" y="1044481"/>
+            <a:ext cx="0" cy="772124"/>
+          </a:xfrm>
+          <a:prstGeom prst="straightConnector1">
+            <a:avLst/>
+          </a:prstGeom>
+          <a:ln w="19050">
+            <a:solidFill>
+              <a:schemeClr val="tx1"/>
+            </a:solidFill>
+            <a:tailEnd type="triangle"/>
+          </a:ln>
+        </p:spPr>
+        <p:style>
+          <a:lnRef idx="1">
+            <a:schemeClr val="accent1"/>
+          </a:lnRef>
+          <a:fillRef idx="0">
+            <a:schemeClr val="accent1"/>
+          </a:fillRef>
+          <a:effectRef idx="0">
+            <a:schemeClr val="accent1"/>
+          </a:effectRef>
+          <a:fontRef idx="minor">
+            <a:schemeClr val="tx1"/>
+          </a:fontRef>
+        </p:style>
+      </p:cxnSp>
+      <p:sp>
+        <p:nvSpPr>
+          <p:cNvPr id="40" name="Rectangle 39"/>
+          <p:cNvSpPr/>
+          <p:nvPr/>
+        </p:nvSpPr>
+        <p:spPr>
+          <a:xfrm>
+            <a:off x="3027854" y="3532743"/>
+            <a:ext cx="1097280" cy="365760"/>
+          </a:xfrm>
+          <a:prstGeom prst="rect">
+            <a:avLst/>
+          </a:prstGeom>
+          <a:solidFill>
+            <a:schemeClr val="accent4">
+              <a:lumMod val="75000"/>
+            </a:schemeClr>
+          </a:solidFill>
+          <a:ln w="19050"/>
+        </p:spPr>
+        <p:style>
+          <a:lnRef idx="2">
+            <a:schemeClr val="accent1">
+              <a:shade val="50000"/>
+            </a:schemeClr>
+          </a:lnRef>
+          <a:fillRef idx="1">
+            <a:schemeClr val="accent1"/>
+          </a:fillRef>
+          <a:effectRef idx="0">
+            <a:schemeClr val="accent1"/>
+          </a:effectRef>
+          <a:fontRef idx="minor">
+            <a:schemeClr val="lt1"/>
+          </a:fontRef>
+        </p:style>
+        <p:txBody>
+          <a:bodyPr rtlCol="0" anchor="ctr"/>
+          <a:lstStyle/>
+          <a:p>
+            <a:pPr algn="ctr"/>
+            <a:r>
+              <a:rPr lang="fr-CA" sz="1400" dirty="0">
+                <a:latin typeface="Calisto MT" panose="02040603050505030304" pitchFamily="18" charset="0"/>
+              </a:rPr>
+              <a:t>Utils</a:t>
+            </a:r>
+            <a:endParaRPr lang="en-US" sz="1400" dirty="0">
+              <a:latin typeface="Calisto MT" panose="02040603050505030304" pitchFamily="18" charset="0"/>
+            </a:endParaRPr>
+          </a:p>
+        </p:txBody>
+      </p:sp>
+      <p:cxnSp>
+        <p:nvCxnSpPr>
+          <p:cNvPr id="42" name="Connector: Elbow 41"/>
+          <p:cNvCxnSpPr>
+            <a:cxnSpLocks/>
+          </p:cNvCxnSpPr>
+          <p:nvPr/>
+        </p:nvCxnSpPr>
+        <p:spPr>
+          <a:xfrm rot="5400000">
+            <a:off x="3475515" y="3433287"/>
+            <a:ext cx="201986" cy="28"/>
+          </a:xfrm>
+          <a:prstGeom prst="bentConnector3">
+            <a:avLst/>
+          </a:prstGeom>
+          <a:ln w="19050">
+            <a:solidFill>
+              <a:schemeClr val="tx1"/>
+            </a:solidFill>
+            <a:tailEnd type="triangle"/>
+          </a:ln>
+        </p:spPr>
+        <p:style>
+          <a:lnRef idx="1">
+            <a:schemeClr val="accent1"/>
+          </a:lnRef>
+          <a:fillRef idx="0">
+            <a:schemeClr val="accent1"/>
+          </a:fillRef>
+          <a:effectRef idx="0">
+            <a:schemeClr val="accent1"/>
+          </a:effectRef>
+          <a:fontRef idx="minor">
+            <a:schemeClr val="tx1"/>
+          </a:fontRef>
+        </p:style>
+      </p:cxnSp>
+    </p:spTree>
+    <p:extLst>
+      <p:ext uri="{BB962C8B-B14F-4D97-AF65-F5344CB8AC3E}">
+        <p14:creationId xmlns:p14="http://schemas.microsoft.com/office/powerpoint/2010/main" val="3769279524"/>
       </p:ext>
     </p:extLst>
   </p:cSld>

</xml_diff>